<commit_message>
updated ppt template for assignment 8
</commit_message>
<xml_diff>
--- a/Assignments/08_Suggested_Presentation_Template.pptx
+++ b/Assignments/08_Suggested_Presentation_Template.pptx
@@ -6,20 +6,20 @@
   </p:sldMasterIdLst>
   <p:sldIdLst>
     <p:sldId id="261" r:id="rId2"/>
-    <p:sldId id="256" r:id="rId3"/>
+    <p:sldId id="262" r:id="rId3"/>
     <p:sldId id="257" r:id="rId4"/>
     <p:sldId id="258" r:id="rId5"/>
-    <p:sldId id="262" r:id="rId6"/>
+    <p:sldId id="263" r:id="rId6"/>
     <p:sldId id="259" r:id="rId7"/>
     <p:sldId id="260" r:id="rId8"/>
   </p:sldIdLst>
-  <p:sldSz cx="9144000" cy="6858000" type="screen4x3"/>
+  <p:sldSz cx="12192000" cy="6858000"/>
   <p:notesSz cx="6858000" cy="9144000"/>
   <p:defaultTextStyle>
     <a:defPPr>
       <a:defRPr lang="en-US"/>
     </a:defPPr>
-    <a:lvl1pPr marL="0" algn="l" defTabSz="457200" rtl="0" eaLnBrk="1" latinLnBrk="0" hangingPunct="1">
+    <a:lvl1pPr marL="0" algn="l" defTabSz="914400" rtl="0" eaLnBrk="1" latinLnBrk="0" hangingPunct="1">
       <a:defRPr sz="1800" kern="1200">
         <a:solidFill>
           <a:schemeClr val="tx1"/>
@@ -29,7 +29,7 @@
         <a:cs typeface="+mn-cs"/>
       </a:defRPr>
     </a:lvl1pPr>
-    <a:lvl2pPr marL="457200" algn="l" defTabSz="457200" rtl="0" eaLnBrk="1" latinLnBrk="0" hangingPunct="1">
+    <a:lvl2pPr marL="457200" algn="l" defTabSz="914400" rtl="0" eaLnBrk="1" latinLnBrk="0" hangingPunct="1">
       <a:defRPr sz="1800" kern="1200">
         <a:solidFill>
           <a:schemeClr val="tx1"/>
@@ -39,7 +39,7 @@
         <a:cs typeface="+mn-cs"/>
       </a:defRPr>
     </a:lvl2pPr>
-    <a:lvl3pPr marL="914400" algn="l" defTabSz="457200" rtl="0" eaLnBrk="1" latinLnBrk="0" hangingPunct="1">
+    <a:lvl3pPr marL="914400" algn="l" defTabSz="914400" rtl="0" eaLnBrk="1" latinLnBrk="0" hangingPunct="1">
       <a:defRPr sz="1800" kern="1200">
         <a:solidFill>
           <a:schemeClr val="tx1"/>
@@ -49,7 +49,7 @@
         <a:cs typeface="+mn-cs"/>
       </a:defRPr>
     </a:lvl3pPr>
-    <a:lvl4pPr marL="1371600" algn="l" defTabSz="457200" rtl="0" eaLnBrk="1" latinLnBrk="0" hangingPunct="1">
+    <a:lvl4pPr marL="1371600" algn="l" defTabSz="914400" rtl="0" eaLnBrk="1" latinLnBrk="0" hangingPunct="1">
       <a:defRPr sz="1800" kern="1200">
         <a:solidFill>
           <a:schemeClr val="tx1"/>
@@ -59,7 +59,7 @@
         <a:cs typeface="+mn-cs"/>
       </a:defRPr>
     </a:lvl4pPr>
-    <a:lvl5pPr marL="1828800" algn="l" defTabSz="457200" rtl="0" eaLnBrk="1" latinLnBrk="0" hangingPunct="1">
+    <a:lvl5pPr marL="1828800" algn="l" defTabSz="914400" rtl="0" eaLnBrk="1" latinLnBrk="0" hangingPunct="1">
       <a:defRPr sz="1800" kern="1200">
         <a:solidFill>
           <a:schemeClr val="tx1"/>
@@ -69,7 +69,7 @@
         <a:cs typeface="+mn-cs"/>
       </a:defRPr>
     </a:lvl5pPr>
-    <a:lvl6pPr marL="2286000" algn="l" defTabSz="457200" rtl="0" eaLnBrk="1" latinLnBrk="0" hangingPunct="1">
+    <a:lvl6pPr marL="2286000" algn="l" defTabSz="914400" rtl="0" eaLnBrk="1" latinLnBrk="0" hangingPunct="1">
       <a:defRPr sz="1800" kern="1200">
         <a:solidFill>
           <a:schemeClr val="tx1"/>
@@ -79,7 +79,7 @@
         <a:cs typeface="+mn-cs"/>
       </a:defRPr>
     </a:lvl6pPr>
-    <a:lvl7pPr marL="2743200" algn="l" defTabSz="457200" rtl="0" eaLnBrk="1" latinLnBrk="0" hangingPunct="1">
+    <a:lvl7pPr marL="2743200" algn="l" defTabSz="914400" rtl="0" eaLnBrk="1" latinLnBrk="0" hangingPunct="1">
       <a:defRPr sz="1800" kern="1200">
         <a:solidFill>
           <a:schemeClr val="tx1"/>
@@ -89,7 +89,7 @@
         <a:cs typeface="+mn-cs"/>
       </a:defRPr>
     </a:lvl7pPr>
-    <a:lvl8pPr marL="3200400" algn="l" defTabSz="457200" rtl="0" eaLnBrk="1" latinLnBrk="0" hangingPunct="1">
+    <a:lvl8pPr marL="3200400" algn="l" defTabSz="914400" rtl="0" eaLnBrk="1" latinLnBrk="0" hangingPunct="1">
       <a:defRPr sz="1800" kern="1200">
         <a:solidFill>
           <a:schemeClr val="tx1"/>
@@ -99,7 +99,7 @@
         <a:cs typeface="+mn-cs"/>
       </a:defRPr>
     </a:lvl8pPr>
-    <a:lvl9pPr marL="3657600" algn="l" defTabSz="457200" rtl="0" eaLnBrk="1" latinLnBrk="0" hangingPunct="1">
+    <a:lvl9pPr marL="3657600" algn="l" defTabSz="914400" rtl="0" eaLnBrk="1" latinLnBrk="0" hangingPunct="1">
       <a:defRPr sz="1800" kern="1200">
         <a:solidFill>
           <a:schemeClr val="tx1"/>
@@ -110,22 +110,6 @@
       </a:defRPr>
     </a:lvl9pPr>
   </p:defaultTextStyle>
-  <p:extLst>
-    <p:ext uri="{EFAFB233-063F-42B5-8137-9DF3F51BA10A}">
-      <p15:sldGuideLst xmlns:p15="http://schemas.microsoft.com/office/powerpoint/2012/main">
-        <p15:guide id="1" orient="horz" pos="2160">
-          <p15:clr>
-            <a:srgbClr val="A4A3A4"/>
-          </p15:clr>
-        </p15:guide>
-        <p15:guide id="2" pos="2880">
-          <p15:clr>
-            <a:srgbClr val="A4A3A4"/>
-          </p15:clr>
-        </p15:guide>
-      </p15:sldGuideLst>
-    </p:ext>
-  </p:extLst>
 </p:presentation>
 </file>
 
@@ -148,7 +132,13 @@
       </p:grpSpPr>
       <p:sp>
         <p:nvSpPr>
-          <p:cNvPr id="2" name="Title 1"/>
+          <p:cNvPr id="2" name="Title 1">
+            <a:extLst>
+              <a:ext uri="{FF2B5EF4-FFF2-40B4-BE49-F238E27FC236}">
+                <a16:creationId xmlns:a16="http://schemas.microsoft.com/office/drawing/2014/main" id="{91321899-78A8-3F4E-B061-A5C1B63DBEDA}"/>
+              </a:ext>
+            </a:extLst>
+          </p:cNvPr>
           <p:cNvSpPr>
             <a:spLocks noGrp="1"/>
           </p:cNvSpPr>
@@ -158,13 +148,17 @@
         </p:nvSpPr>
         <p:spPr>
           <a:xfrm>
-            <a:off x="685800" y="2130425"/>
-            <a:ext cx="7772400" cy="1470025"/>
+            <a:off x="1524000" y="1122363"/>
+            <a:ext cx="9144000" cy="2387600"/>
           </a:xfrm>
         </p:spPr>
         <p:txBody>
-          <a:bodyPr/>
-          <a:lstStyle/>
+          <a:bodyPr anchor="b"/>
+          <a:lstStyle>
+            <a:lvl1pPr algn="ctr">
+              <a:defRPr sz="6000"/>
+            </a:lvl1pPr>
+          </a:lstStyle>
           <a:p>
             <a:r>
               <a:rPr lang="en-US"/>
@@ -175,7 +169,13 @@
       </p:sp>
       <p:sp>
         <p:nvSpPr>
-          <p:cNvPr id="3" name="Subtitle 2"/>
+          <p:cNvPr id="3" name="Subtitle 2">
+            <a:extLst>
+              <a:ext uri="{FF2B5EF4-FFF2-40B4-BE49-F238E27FC236}">
+                <a16:creationId xmlns:a16="http://schemas.microsoft.com/office/drawing/2014/main" id="{20B05221-F975-E846-84E4-586A00996289}"/>
+              </a:ext>
+            </a:extLst>
+          </p:cNvPr>
           <p:cNvSpPr>
             <a:spLocks noGrp="1"/>
           </p:cNvSpPr>
@@ -185,8 +185,8 @@
         </p:nvSpPr>
         <p:spPr>
           <a:xfrm>
-            <a:off x="1371600" y="3886200"/>
-            <a:ext cx="6400800" cy="1752600"/>
+            <a:off x="1524000" y="3602038"/>
+            <a:ext cx="9144000" cy="1655762"/>
           </a:xfrm>
         </p:spPr>
         <p:txBody>
@@ -194,93 +194,39 @@
           <a:lstStyle>
             <a:lvl1pPr marL="0" indent="0" algn="ctr">
               <a:buNone/>
-              <a:defRPr>
-                <a:solidFill>
-                  <a:schemeClr val="tx1">
-                    <a:tint val="75000"/>
-                  </a:schemeClr>
-                </a:solidFill>
-              </a:defRPr>
+              <a:defRPr sz="2400"/>
             </a:lvl1pPr>
             <a:lvl2pPr marL="457200" indent="0" algn="ctr">
               <a:buNone/>
-              <a:defRPr>
-                <a:solidFill>
-                  <a:schemeClr val="tx1">
-                    <a:tint val="75000"/>
-                  </a:schemeClr>
-                </a:solidFill>
-              </a:defRPr>
+              <a:defRPr sz="2000"/>
             </a:lvl2pPr>
             <a:lvl3pPr marL="914400" indent="0" algn="ctr">
               <a:buNone/>
-              <a:defRPr>
-                <a:solidFill>
-                  <a:schemeClr val="tx1">
-                    <a:tint val="75000"/>
-                  </a:schemeClr>
-                </a:solidFill>
-              </a:defRPr>
+              <a:defRPr sz="1800"/>
             </a:lvl3pPr>
             <a:lvl4pPr marL="1371600" indent="0" algn="ctr">
               <a:buNone/>
-              <a:defRPr>
-                <a:solidFill>
-                  <a:schemeClr val="tx1">
-                    <a:tint val="75000"/>
-                  </a:schemeClr>
-                </a:solidFill>
-              </a:defRPr>
+              <a:defRPr sz="1600"/>
             </a:lvl4pPr>
             <a:lvl5pPr marL="1828800" indent="0" algn="ctr">
               <a:buNone/>
-              <a:defRPr>
-                <a:solidFill>
-                  <a:schemeClr val="tx1">
-                    <a:tint val="75000"/>
-                  </a:schemeClr>
-                </a:solidFill>
-              </a:defRPr>
+              <a:defRPr sz="1600"/>
             </a:lvl5pPr>
             <a:lvl6pPr marL="2286000" indent="0" algn="ctr">
               <a:buNone/>
-              <a:defRPr>
-                <a:solidFill>
-                  <a:schemeClr val="tx1">
-                    <a:tint val="75000"/>
-                  </a:schemeClr>
-                </a:solidFill>
-              </a:defRPr>
+              <a:defRPr sz="1600"/>
             </a:lvl6pPr>
             <a:lvl7pPr marL="2743200" indent="0" algn="ctr">
               <a:buNone/>
-              <a:defRPr>
-                <a:solidFill>
-                  <a:schemeClr val="tx1">
-                    <a:tint val="75000"/>
-                  </a:schemeClr>
-                </a:solidFill>
-              </a:defRPr>
+              <a:defRPr sz="1600"/>
             </a:lvl7pPr>
             <a:lvl8pPr marL="3200400" indent="0" algn="ctr">
               <a:buNone/>
-              <a:defRPr>
-                <a:solidFill>
-                  <a:schemeClr val="tx1">
-                    <a:tint val="75000"/>
-                  </a:schemeClr>
-                </a:solidFill>
-              </a:defRPr>
+              <a:defRPr sz="1600"/>
             </a:lvl8pPr>
             <a:lvl9pPr marL="3657600" indent="0" algn="ctr">
               <a:buNone/>
-              <a:defRPr>
-                <a:solidFill>
-                  <a:schemeClr val="tx1">
-                    <a:tint val="75000"/>
-                  </a:schemeClr>
-                </a:solidFill>
-              </a:defRPr>
+              <a:defRPr sz="1600"/>
             </a:lvl9pPr>
           </a:lstStyle>
           <a:p>
@@ -293,7 +239,13 @@
       </p:sp>
       <p:sp>
         <p:nvSpPr>
-          <p:cNvPr id="4" name="Date Placeholder 3"/>
+          <p:cNvPr id="4" name="Date Placeholder 3">
+            <a:extLst>
+              <a:ext uri="{FF2B5EF4-FFF2-40B4-BE49-F238E27FC236}">
+                <a16:creationId xmlns:a16="http://schemas.microsoft.com/office/drawing/2014/main" id="{DA4CEA12-096F-FB4E-96B1-6A93B82BA9C6}"/>
+              </a:ext>
+            </a:extLst>
+          </p:cNvPr>
           <p:cNvSpPr>
             <a:spLocks noGrp="1"/>
           </p:cNvSpPr>
@@ -306,9 +258,9 @@
           <a:bodyPr/>
           <a:lstStyle/>
           <a:p>
-            <a:fld id="{8698FBD9-E1C8-AC42-ACD5-5EE8B5256BDC}" type="datetimeFigureOut">
+            <a:fld id="{BCE50573-2E39-8C49-8B50-A4B8BEC2B519}" type="datetimeFigureOut">
               <a:rPr lang="en-US" smtClean="0"/>
-              <a:t>3/29/19</a:t>
+              <a:t>3/26/21</a:t>
             </a:fld>
             <a:endParaRPr lang="en-US"/>
           </a:p>
@@ -316,7 +268,13 @@
       </p:sp>
       <p:sp>
         <p:nvSpPr>
-          <p:cNvPr id="5" name="Footer Placeholder 4"/>
+          <p:cNvPr id="5" name="Footer Placeholder 4">
+            <a:extLst>
+              <a:ext uri="{FF2B5EF4-FFF2-40B4-BE49-F238E27FC236}">
+                <a16:creationId xmlns:a16="http://schemas.microsoft.com/office/drawing/2014/main" id="{552D8FFC-87D7-EA4F-A123-4E5F11927F18}"/>
+              </a:ext>
+            </a:extLst>
+          </p:cNvPr>
           <p:cNvSpPr>
             <a:spLocks noGrp="1"/>
           </p:cNvSpPr>
@@ -335,7 +293,13 @@
       </p:sp>
       <p:sp>
         <p:nvSpPr>
-          <p:cNvPr id="6" name="Slide Number Placeholder 5"/>
+          <p:cNvPr id="6" name="Slide Number Placeholder 5">
+            <a:extLst>
+              <a:ext uri="{FF2B5EF4-FFF2-40B4-BE49-F238E27FC236}">
+                <a16:creationId xmlns:a16="http://schemas.microsoft.com/office/drawing/2014/main" id="{E7EB3EE5-8D33-604B-BF42-49275210D34C}"/>
+              </a:ext>
+            </a:extLst>
+          </p:cNvPr>
           <p:cNvSpPr>
             <a:spLocks noGrp="1"/>
           </p:cNvSpPr>
@@ -348,7 +312,7 @@
           <a:bodyPr/>
           <a:lstStyle/>
           <a:p>
-            <a:fld id="{CF24EDC1-575E-7249-A6A7-C51D012F9C4F}" type="slidenum">
+            <a:fld id="{A000F695-1BFF-3442-9916-0DF25F28D045}" type="slidenum">
               <a:rPr lang="en-US" smtClean="0"/>
               <a:t>‹#›</a:t>
             </a:fld>
@@ -359,7 +323,7 @@
     </p:spTree>
     <p:extLst>
       <p:ext uri="{BB962C8B-B14F-4D97-AF65-F5344CB8AC3E}">
-        <p14:creationId xmlns:p14="http://schemas.microsoft.com/office/powerpoint/2010/main" val="3694027738"/>
+        <p14:creationId xmlns:p14="http://schemas.microsoft.com/office/powerpoint/2010/main" val="1418863694"/>
       </p:ext>
     </p:extLst>
   </p:cSld>
@@ -388,7 +352,13 @@
       </p:grpSpPr>
       <p:sp>
         <p:nvSpPr>
-          <p:cNvPr id="2" name="Title 1"/>
+          <p:cNvPr id="2" name="Title 1">
+            <a:extLst>
+              <a:ext uri="{FF2B5EF4-FFF2-40B4-BE49-F238E27FC236}">
+                <a16:creationId xmlns:a16="http://schemas.microsoft.com/office/drawing/2014/main" id="{A8BD14F2-7744-3A43-A9D2-AF520BA236B6}"/>
+              </a:ext>
+            </a:extLst>
+          </p:cNvPr>
           <p:cNvSpPr>
             <a:spLocks noGrp="1"/>
           </p:cNvSpPr>
@@ -410,7 +380,13 @@
       </p:sp>
       <p:sp>
         <p:nvSpPr>
-          <p:cNvPr id="3" name="Vertical Text Placeholder 2"/>
+          <p:cNvPr id="3" name="Vertical Text Placeholder 2">
+            <a:extLst>
+              <a:ext uri="{FF2B5EF4-FFF2-40B4-BE49-F238E27FC236}">
+                <a16:creationId xmlns:a16="http://schemas.microsoft.com/office/drawing/2014/main" id="{2E5E2DCF-5E24-9A45-B520-54F046F0F5B9}"/>
+              </a:ext>
+            </a:extLst>
+          </p:cNvPr>
           <p:cNvSpPr>
             <a:spLocks noGrp="1"/>
           </p:cNvSpPr>
@@ -461,7 +437,13 @@
       </p:sp>
       <p:sp>
         <p:nvSpPr>
-          <p:cNvPr id="4" name="Date Placeholder 3"/>
+          <p:cNvPr id="4" name="Date Placeholder 3">
+            <a:extLst>
+              <a:ext uri="{FF2B5EF4-FFF2-40B4-BE49-F238E27FC236}">
+                <a16:creationId xmlns:a16="http://schemas.microsoft.com/office/drawing/2014/main" id="{95FBCEE9-6C38-4941-AB26-A1D62D19543B}"/>
+              </a:ext>
+            </a:extLst>
+          </p:cNvPr>
           <p:cNvSpPr>
             <a:spLocks noGrp="1"/>
           </p:cNvSpPr>
@@ -474,9 +456,9 @@
           <a:bodyPr/>
           <a:lstStyle/>
           <a:p>
-            <a:fld id="{8698FBD9-E1C8-AC42-ACD5-5EE8B5256BDC}" type="datetimeFigureOut">
+            <a:fld id="{BCE50573-2E39-8C49-8B50-A4B8BEC2B519}" type="datetimeFigureOut">
               <a:rPr lang="en-US" smtClean="0"/>
-              <a:t>3/29/19</a:t>
+              <a:t>3/26/21</a:t>
             </a:fld>
             <a:endParaRPr lang="en-US"/>
           </a:p>
@@ -484,7 +466,13 @@
       </p:sp>
       <p:sp>
         <p:nvSpPr>
-          <p:cNvPr id="5" name="Footer Placeholder 4"/>
+          <p:cNvPr id="5" name="Footer Placeholder 4">
+            <a:extLst>
+              <a:ext uri="{FF2B5EF4-FFF2-40B4-BE49-F238E27FC236}">
+                <a16:creationId xmlns:a16="http://schemas.microsoft.com/office/drawing/2014/main" id="{ED03A5A1-693D-C444-B0D4-6CC99C36FD92}"/>
+              </a:ext>
+            </a:extLst>
+          </p:cNvPr>
           <p:cNvSpPr>
             <a:spLocks noGrp="1"/>
           </p:cNvSpPr>
@@ -503,7 +491,13 @@
       </p:sp>
       <p:sp>
         <p:nvSpPr>
-          <p:cNvPr id="6" name="Slide Number Placeholder 5"/>
+          <p:cNvPr id="6" name="Slide Number Placeholder 5">
+            <a:extLst>
+              <a:ext uri="{FF2B5EF4-FFF2-40B4-BE49-F238E27FC236}">
+                <a16:creationId xmlns:a16="http://schemas.microsoft.com/office/drawing/2014/main" id="{7A1CD723-9374-144C-BA47-D2382ECF11DA}"/>
+              </a:ext>
+            </a:extLst>
+          </p:cNvPr>
           <p:cNvSpPr>
             <a:spLocks noGrp="1"/>
           </p:cNvSpPr>
@@ -516,7 +510,7 @@
           <a:bodyPr/>
           <a:lstStyle/>
           <a:p>
-            <a:fld id="{CF24EDC1-575E-7249-A6A7-C51D012F9C4F}" type="slidenum">
+            <a:fld id="{A000F695-1BFF-3442-9916-0DF25F28D045}" type="slidenum">
               <a:rPr lang="en-US" smtClean="0"/>
               <a:t>‹#›</a:t>
             </a:fld>
@@ -527,7 +521,7 @@
     </p:spTree>
     <p:extLst>
       <p:ext uri="{BB962C8B-B14F-4D97-AF65-F5344CB8AC3E}">
-        <p14:creationId xmlns:p14="http://schemas.microsoft.com/office/powerpoint/2010/main" val="467779695"/>
+        <p14:creationId xmlns:p14="http://schemas.microsoft.com/office/powerpoint/2010/main" val="856912312"/>
       </p:ext>
     </p:extLst>
   </p:cSld>
@@ -556,7 +550,13 @@
       </p:grpSpPr>
       <p:sp>
         <p:nvSpPr>
-          <p:cNvPr id="2" name="Vertical Title 1"/>
+          <p:cNvPr id="2" name="Vertical Title 1">
+            <a:extLst>
+              <a:ext uri="{FF2B5EF4-FFF2-40B4-BE49-F238E27FC236}">
+                <a16:creationId xmlns:a16="http://schemas.microsoft.com/office/drawing/2014/main" id="{B0D9CE05-BACE-2249-AC21-0EEAECE59A4D}"/>
+              </a:ext>
+            </a:extLst>
+          </p:cNvPr>
           <p:cNvSpPr>
             <a:spLocks noGrp="1"/>
           </p:cNvSpPr>
@@ -566,8 +566,8 @@
         </p:nvSpPr>
         <p:spPr>
           <a:xfrm>
-            <a:off x="6629400" y="274638"/>
-            <a:ext cx="2057400" cy="5851525"/>
+            <a:off x="8724900" y="365125"/>
+            <a:ext cx="2628900" cy="5811838"/>
           </a:xfrm>
         </p:spPr>
         <p:txBody>
@@ -583,7 +583,13 @@
       </p:sp>
       <p:sp>
         <p:nvSpPr>
-          <p:cNvPr id="3" name="Vertical Text Placeholder 2"/>
+          <p:cNvPr id="3" name="Vertical Text Placeholder 2">
+            <a:extLst>
+              <a:ext uri="{FF2B5EF4-FFF2-40B4-BE49-F238E27FC236}">
+                <a16:creationId xmlns:a16="http://schemas.microsoft.com/office/drawing/2014/main" id="{C8089C63-F431-4543-895C-26C3FA9F0E7F}"/>
+              </a:ext>
+            </a:extLst>
+          </p:cNvPr>
           <p:cNvSpPr>
             <a:spLocks noGrp="1"/>
           </p:cNvSpPr>
@@ -593,8 +599,8 @@
         </p:nvSpPr>
         <p:spPr>
           <a:xfrm>
-            <a:off x="457200" y="274638"/>
-            <a:ext cx="6019800" cy="5851525"/>
+            <a:off x="838200" y="365125"/>
+            <a:ext cx="7734300" cy="5811838"/>
           </a:xfrm>
         </p:spPr>
         <p:txBody>
@@ -639,7 +645,13 @@
       </p:sp>
       <p:sp>
         <p:nvSpPr>
-          <p:cNvPr id="4" name="Date Placeholder 3"/>
+          <p:cNvPr id="4" name="Date Placeholder 3">
+            <a:extLst>
+              <a:ext uri="{FF2B5EF4-FFF2-40B4-BE49-F238E27FC236}">
+                <a16:creationId xmlns:a16="http://schemas.microsoft.com/office/drawing/2014/main" id="{056A73B0-6E5A-A942-8985-D7211F690262}"/>
+              </a:ext>
+            </a:extLst>
+          </p:cNvPr>
           <p:cNvSpPr>
             <a:spLocks noGrp="1"/>
           </p:cNvSpPr>
@@ -652,9 +664,9 @@
           <a:bodyPr/>
           <a:lstStyle/>
           <a:p>
-            <a:fld id="{8698FBD9-E1C8-AC42-ACD5-5EE8B5256BDC}" type="datetimeFigureOut">
+            <a:fld id="{BCE50573-2E39-8C49-8B50-A4B8BEC2B519}" type="datetimeFigureOut">
               <a:rPr lang="en-US" smtClean="0"/>
-              <a:t>3/29/19</a:t>
+              <a:t>3/26/21</a:t>
             </a:fld>
             <a:endParaRPr lang="en-US"/>
           </a:p>
@@ -662,7 +674,13 @@
       </p:sp>
       <p:sp>
         <p:nvSpPr>
-          <p:cNvPr id="5" name="Footer Placeholder 4"/>
+          <p:cNvPr id="5" name="Footer Placeholder 4">
+            <a:extLst>
+              <a:ext uri="{FF2B5EF4-FFF2-40B4-BE49-F238E27FC236}">
+                <a16:creationId xmlns:a16="http://schemas.microsoft.com/office/drawing/2014/main" id="{DF82A105-3DD8-244B-BDCF-BFD6ABFC5E1A}"/>
+              </a:ext>
+            </a:extLst>
+          </p:cNvPr>
           <p:cNvSpPr>
             <a:spLocks noGrp="1"/>
           </p:cNvSpPr>
@@ -681,7 +699,13 @@
       </p:sp>
       <p:sp>
         <p:nvSpPr>
-          <p:cNvPr id="6" name="Slide Number Placeholder 5"/>
+          <p:cNvPr id="6" name="Slide Number Placeholder 5">
+            <a:extLst>
+              <a:ext uri="{FF2B5EF4-FFF2-40B4-BE49-F238E27FC236}">
+                <a16:creationId xmlns:a16="http://schemas.microsoft.com/office/drawing/2014/main" id="{A3F3A3E9-63F5-3F4E-AA0A-FE5F0389FE71}"/>
+              </a:ext>
+            </a:extLst>
+          </p:cNvPr>
           <p:cNvSpPr>
             <a:spLocks noGrp="1"/>
           </p:cNvSpPr>
@@ -694,7 +718,7 @@
           <a:bodyPr/>
           <a:lstStyle/>
           <a:p>
-            <a:fld id="{CF24EDC1-575E-7249-A6A7-C51D012F9C4F}" type="slidenum">
+            <a:fld id="{A000F695-1BFF-3442-9916-0DF25F28D045}" type="slidenum">
               <a:rPr lang="en-US" smtClean="0"/>
               <a:t>‹#›</a:t>
             </a:fld>
@@ -705,7 +729,7 @@
     </p:spTree>
     <p:extLst>
       <p:ext uri="{BB962C8B-B14F-4D97-AF65-F5344CB8AC3E}">
-        <p14:creationId xmlns:p14="http://schemas.microsoft.com/office/powerpoint/2010/main" val="3765444880"/>
+        <p14:creationId xmlns:p14="http://schemas.microsoft.com/office/powerpoint/2010/main" val="3305529435"/>
       </p:ext>
     </p:extLst>
   </p:cSld>
@@ -734,7 +758,13 @@
       </p:grpSpPr>
       <p:sp>
         <p:nvSpPr>
-          <p:cNvPr id="2" name="Title 1"/>
+          <p:cNvPr id="2" name="Title 1">
+            <a:extLst>
+              <a:ext uri="{FF2B5EF4-FFF2-40B4-BE49-F238E27FC236}">
+                <a16:creationId xmlns:a16="http://schemas.microsoft.com/office/drawing/2014/main" id="{2EFD2ED9-0CB3-8F4D-A660-FA918C125D60}"/>
+              </a:ext>
+            </a:extLst>
+          </p:cNvPr>
           <p:cNvSpPr>
             <a:spLocks noGrp="1"/>
           </p:cNvSpPr>
@@ -756,7 +786,13 @@
       </p:sp>
       <p:sp>
         <p:nvSpPr>
-          <p:cNvPr id="3" name="Content Placeholder 2"/>
+          <p:cNvPr id="3" name="Content Placeholder 2">
+            <a:extLst>
+              <a:ext uri="{FF2B5EF4-FFF2-40B4-BE49-F238E27FC236}">
+                <a16:creationId xmlns:a16="http://schemas.microsoft.com/office/drawing/2014/main" id="{5C26C8D0-81A7-E94C-9290-F766FE32A04C}"/>
+              </a:ext>
+            </a:extLst>
+          </p:cNvPr>
           <p:cNvSpPr>
             <a:spLocks noGrp="1"/>
           </p:cNvSpPr>
@@ -807,7 +843,13 @@
       </p:sp>
       <p:sp>
         <p:nvSpPr>
-          <p:cNvPr id="4" name="Date Placeholder 3"/>
+          <p:cNvPr id="4" name="Date Placeholder 3">
+            <a:extLst>
+              <a:ext uri="{FF2B5EF4-FFF2-40B4-BE49-F238E27FC236}">
+                <a16:creationId xmlns:a16="http://schemas.microsoft.com/office/drawing/2014/main" id="{0C4FC6F7-C021-494E-8AF2-DD2DC325B564}"/>
+              </a:ext>
+            </a:extLst>
+          </p:cNvPr>
           <p:cNvSpPr>
             <a:spLocks noGrp="1"/>
           </p:cNvSpPr>
@@ -820,9 +862,9 @@
           <a:bodyPr/>
           <a:lstStyle/>
           <a:p>
-            <a:fld id="{8698FBD9-E1C8-AC42-ACD5-5EE8B5256BDC}" type="datetimeFigureOut">
+            <a:fld id="{BCE50573-2E39-8C49-8B50-A4B8BEC2B519}" type="datetimeFigureOut">
               <a:rPr lang="en-US" smtClean="0"/>
-              <a:t>3/29/19</a:t>
+              <a:t>3/26/21</a:t>
             </a:fld>
             <a:endParaRPr lang="en-US"/>
           </a:p>
@@ -830,7 +872,13 @@
       </p:sp>
       <p:sp>
         <p:nvSpPr>
-          <p:cNvPr id="5" name="Footer Placeholder 4"/>
+          <p:cNvPr id="5" name="Footer Placeholder 4">
+            <a:extLst>
+              <a:ext uri="{FF2B5EF4-FFF2-40B4-BE49-F238E27FC236}">
+                <a16:creationId xmlns:a16="http://schemas.microsoft.com/office/drawing/2014/main" id="{9C4F86D4-B203-D04D-BD25-C4BFF5796C02}"/>
+              </a:ext>
+            </a:extLst>
+          </p:cNvPr>
           <p:cNvSpPr>
             <a:spLocks noGrp="1"/>
           </p:cNvSpPr>
@@ -849,7 +897,13 @@
       </p:sp>
       <p:sp>
         <p:nvSpPr>
-          <p:cNvPr id="6" name="Slide Number Placeholder 5"/>
+          <p:cNvPr id="6" name="Slide Number Placeholder 5">
+            <a:extLst>
+              <a:ext uri="{FF2B5EF4-FFF2-40B4-BE49-F238E27FC236}">
+                <a16:creationId xmlns:a16="http://schemas.microsoft.com/office/drawing/2014/main" id="{EE8AEF83-7257-C147-ABD5-9C0D324AC9FB}"/>
+              </a:ext>
+            </a:extLst>
+          </p:cNvPr>
           <p:cNvSpPr>
             <a:spLocks noGrp="1"/>
           </p:cNvSpPr>
@@ -862,7 +916,7 @@
           <a:bodyPr/>
           <a:lstStyle/>
           <a:p>
-            <a:fld id="{CF24EDC1-575E-7249-A6A7-C51D012F9C4F}" type="slidenum">
+            <a:fld id="{A000F695-1BFF-3442-9916-0DF25F28D045}" type="slidenum">
               <a:rPr lang="en-US" smtClean="0"/>
               <a:t>‹#›</a:t>
             </a:fld>
@@ -873,7 +927,7 @@
     </p:spTree>
     <p:extLst>
       <p:ext uri="{BB962C8B-B14F-4D97-AF65-F5344CB8AC3E}">
-        <p14:creationId xmlns:p14="http://schemas.microsoft.com/office/powerpoint/2010/main" val="4284945684"/>
+        <p14:creationId xmlns:p14="http://schemas.microsoft.com/office/powerpoint/2010/main" val="3067540996"/>
       </p:ext>
     </p:extLst>
   </p:cSld>
@@ -902,7 +956,13 @@
       </p:grpSpPr>
       <p:sp>
         <p:nvSpPr>
-          <p:cNvPr id="2" name="Title 1"/>
+          <p:cNvPr id="2" name="Title 1">
+            <a:extLst>
+              <a:ext uri="{FF2B5EF4-FFF2-40B4-BE49-F238E27FC236}">
+                <a16:creationId xmlns:a16="http://schemas.microsoft.com/office/drawing/2014/main" id="{07AD60CB-862F-7542-B715-2F54C7ABA34A}"/>
+              </a:ext>
+            </a:extLst>
+          </p:cNvPr>
           <p:cNvSpPr>
             <a:spLocks noGrp="1"/>
           </p:cNvSpPr>
@@ -912,15 +972,15 @@
         </p:nvSpPr>
         <p:spPr>
           <a:xfrm>
-            <a:off x="722313" y="4406900"/>
-            <a:ext cx="7772400" cy="1362075"/>
+            <a:off x="831850" y="1709738"/>
+            <a:ext cx="10515600" cy="2852737"/>
           </a:xfrm>
         </p:spPr>
         <p:txBody>
-          <a:bodyPr anchor="t"/>
+          <a:bodyPr anchor="b"/>
           <a:lstStyle>
-            <a:lvl1pPr algn="l">
-              <a:defRPr sz="4000" b="1" cap="all"/>
+            <a:lvl1pPr>
+              <a:defRPr sz="6000"/>
             </a:lvl1pPr>
           </a:lstStyle>
           <a:p>
@@ -933,7 +993,13 @@
       </p:sp>
       <p:sp>
         <p:nvSpPr>
-          <p:cNvPr id="3" name="Text Placeholder 2"/>
+          <p:cNvPr id="3" name="Text Placeholder 2">
+            <a:extLst>
+              <a:ext uri="{FF2B5EF4-FFF2-40B4-BE49-F238E27FC236}">
+                <a16:creationId xmlns:a16="http://schemas.microsoft.com/office/drawing/2014/main" id="{93439EF7-D23B-934E-BE72-01AB71FE404D}"/>
+              </a:ext>
+            </a:extLst>
+          </p:cNvPr>
           <p:cNvSpPr>
             <a:spLocks noGrp="1"/>
           </p:cNvSpPr>
@@ -943,16 +1009,16 @@
         </p:nvSpPr>
         <p:spPr>
           <a:xfrm>
-            <a:off x="722313" y="2906713"/>
-            <a:ext cx="7772400" cy="1500187"/>
+            <a:off x="831850" y="4589463"/>
+            <a:ext cx="10515600" cy="1500187"/>
           </a:xfrm>
         </p:spPr>
         <p:txBody>
-          <a:bodyPr anchor="b"/>
+          <a:bodyPr/>
           <a:lstStyle>
             <a:lvl1pPr marL="0" indent="0">
               <a:buNone/>
-              <a:defRPr sz="2000">
+              <a:defRPr sz="2400">
                 <a:solidFill>
                   <a:schemeClr val="tx1">
                     <a:tint val="75000"/>
@@ -962,7 +1028,7 @@
             </a:lvl1pPr>
             <a:lvl2pPr marL="457200" indent="0">
               <a:buNone/>
-              <a:defRPr sz="1800">
+              <a:defRPr sz="2000">
                 <a:solidFill>
                   <a:schemeClr val="tx1">
                     <a:tint val="75000"/>
@@ -972,7 +1038,7 @@
             </a:lvl2pPr>
             <a:lvl3pPr marL="914400" indent="0">
               <a:buNone/>
-              <a:defRPr sz="1600">
+              <a:defRPr sz="1800">
                 <a:solidFill>
                   <a:schemeClr val="tx1">
                     <a:tint val="75000"/>
@@ -982,7 +1048,7 @@
             </a:lvl3pPr>
             <a:lvl4pPr marL="1371600" indent="0">
               <a:buNone/>
-              <a:defRPr sz="1400">
+              <a:defRPr sz="1600">
                 <a:solidFill>
                   <a:schemeClr val="tx1">
                     <a:tint val="75000"/>
@@ -992,7 +1058,7 @@
             </a:lvl4pPr>
             <a:lvl5pPr marL="1828800" indent="0">
               <a:buNone/>
-              <a:defRPr sz="1400">
+              <a:defRPr sz="1600">
                 <a:solidFill>
                   <a:schemeClr val="tx1">
                     <a:tint val="75000"/>
@@ -1002,7 +1068,7 @@
             </a:lvl5pPr>
             <a:lvl6pPr marL="2286000" indent="0">
               <a:buNone/>
-              <a:defRPr sz="1400">
+              <a:defRPr sz="1600">
                 <a:solidFill>
                   <a:schemeClr val="tx1">
                     <a:tint val="75000"/>
@@ -1012,7 +1078,7 @@
             </a:lvl6pPr>
             <a:lvl7pPr marL="2743200" indent="0">
               <a:buNone/>
-              <a:defRPr sz="1400">
+              <a:defRPr sz="1600">
                 <a:solidFill>
                   <a:schemeClr val="tx1">
                     <a:tint val="75000"/>
@@ -1022,7 +1088,7 @@
             </a:lvl7pPr>
             <a:lvl8pPr marL="3200400" indent="0">
               <a:buNone/>
-              <a:defRPr sz="1400">
+              <a:defRPr sz="1600">
                 <a:solidFill>
                   <a:schemeClr val="tx1">
                     <a:tint val="75000"/>
@@ -1032,7 +1098,7 @@
             </a:lvl8pPr>
             <a:lvl9pPr marL="3657600" indent="0">
               <a:buNone/>
-              <a:defRPr sz="1400">
+              <a:defRPr sz="1600">
                 <a:solidFill>
                   <a:schemeClr val="tx1">
                     <a:tint val="75000"/>
@@ -1052,7 +1118,13 @@
       </p:sp>
       <p:sp>
         <p:nvSpPr>
-          <p:cNvPr id="4" name="Date Placeholder 3"/>
+          <p:cNvPr id="4" name="Date Placeholder 3">
+            <a:extLst>
+              <a:ext uri="{FF2B5EF4-FFF2-40B4-BE49-F238E27FC236}">
+                <a16:creationId xmlns:a16="http://schemas.microsoft.com/office/drawing/2014/main" id="{04974BB7-13B7-1F4D-A70F-2AB3F2D093FC}"/>
+              </a:ext>
+            </a:extLst>
+          </p:cNvPr>
           <p:cNvSpPr>
             <a:spLocks noGrp="1"/>
           </p:cNvSpPr>
@@ -1065,9 +1137,9 @@
           <a:bodyPr/>
           <a:lstStyle/>
           <a:p>
-            <a:fld id="{8698FBD9-E1C8-AC42-ACD5-5EE8B5256BDC}" type="datetimeFigureOut">
+            <a:fld id="{BCE50573-2E39-8C49-8B50-A4B8BEC2B519}" type="datetimeFigureOut">
               <a:rPr lang="en-US" smtClean="0"/>
-              <a:t>3/29/19</a:t>
+              <a:t>3/26/21</a:t>
             </a:fld>
             <a:endParaRPr lang="en-US"/>
           </a:p>
@@ -1075,7 +1147,13 @@
       </p:sp>
       <p:sp>
         <p:nvSpPr>
-          <p:cNvPr id="5" name="Footer Placeholder 4"/>
+          <p:cNvPr id="5" name="Footer Placeholder 4">
+            <a:extLst>
+              <a:ext uri="{FF2B5EF4-FFF2-40B4-BE49-F238E27FC236}">
+                <a16:creationId xmlns:a16="http://schemas.microsoft.com/office/drawing/2014/main" id="{809AC44B-5B21-2E4B-AB27-A1E233AFDCC0}"/>
+              </a:ext>
+            </a:extLst>
+          </p:cNvPr>
           <p:cNvSpPr>
             <a:spLocks noGrp="1"/>
           </p:cNvSpPr>
@@ -1094,7 +1172,13 @@
       </p:sp>
       <p:sp>
         <p:nvSpPr>
-          <p:cNvPr id="6" name="Slide Number Placeholder 5"/>
+          <p:cNvPr id="6" name="Slide Number Placeholder 5">
+            <a:extLst>
+              <a:ext uri="{FF2B5EF4-FFF2-40B4-BE49-F238E27FC236}">
+                <a16:creationId xmlns:a16="http://schemas.microsoft.com/office/drawing/2014/main" id="{A4D310C8-A759-844C-A00B-06048B30A936}"/>
+              </a:ext>
+            </a:extLst>
+          </p:cNvPr>
           <p:cNvSpPr>
             <a:spLocks noGrp="1"/>
           </p:cNvSpPr>
@@ -1107,7 +1191,7 @@
           <a:bodyPr/>
           <a:lstStyle/>
           <a:p>
-            <a:fld id="{CF24EDC1-575E-7249-A6A7-C51D012F9C4F}" type="slidenum">
+            <a:fld id="{A000F695-1BFF-3442-9916-0DF25F28D045}" type="slidenum">
               <a:rPr lang="en-US" smtClean="0"/>
               <a:t>‹#›</a:t>
             </a:fld>
@@ -1118,7 +1202,7 @@
     </p:spTree>
     <p:extLst>
       <p:ext uri="{BB962C8B-B14F-4D97-AF65-F5344CB8AC3E}">
-        <p14:creationId xmlns:p14="http://schemas.microsoft.com/office/powerpoint/2010/main" val="3941894326"/>
+        <p14:creationId xmlns:p14="http://schemas.microsoft.com/office/powerpoint/2010/main" val="3137311344"/>
       </p:ext>
     </p:extLst>
   </p:cSld>
@@ -1147,7 +1231,13 @@
       </p:grpSpPr>
       <p:sp>
         <p:nvSpPr>
-          <p:cNvPr id="2" name="Title 1"/>
+          <p:cNvPr id="2" name="Title 1">
+            <a:extLst>
+              <a:ext uri="{FF2B5EF4-FFF2-40B4-BE49-F238E27FC236}">
+                <a16:creationId xmlns:a16="http://schemas.microsoft.com/office/drawing/2014/main" id="{3F327332-FE9B-F544-83E3-9CF882036A4D}"/>
+              </a:ext>
+            </a:extLst>
+          </p:cNvPr>
           <p:cNvSpPr>
             <a:spLocks noGrp="1"/>
           </p:cNvSpPr>
@@ -1169,7 +1259,13 @@
       </p:sp>
       <p:sp>
         <p:nvSpPr>
-          <p:cNvPr id="3" name="Content Placeholder 2"/>
+          <p:cNvPr id="3" name="Content Placeholder 2">
+            <a:extLst>
+              <a:ext uri="{FF2B5EF4-FFF2-40B4-BE49-F238E27FC236}">
+                <a16:creationId xmlns:a16="http://schemas.microsoft.com/office/drawing/2014/main" id="{B2922DE4-D7FA-DC40-A477-A52C57B23B33}"/>
+              </a:ext>
+            </a:extLst>
+          </p:cNvPr>
           <p:cNvSpPr>
             <a:spLocks noGrp="1"/>
           </p:cNvSpPr>
@@ -1179,41 +1275,13 @@
         </p:nvSpPr>
         <p:spPr>
           <a:xfrm>
-            <a:off x="457200" y="1600200"/>
-            <a:ext cx="4038600" cy="4525963"/>
+            <a:off x="838200" y="1825625"/>
+            <a:ext cx="5181600" cy="4351338"/>
           </a:xfrm>
         </p:spPr>
         <p:txBody>
           <a:bodyPr/>
-          <a:lstStyle>
-            <a:lvl1pPr>
-              <a:defRPr sz="2800"/>
-            </a:lvl1pPr>
-            <a:lvl2pPr>
-              <a:defRPr sz="2400"/>
-            </a:lvl2pPr>
-            <a:lvl3pPr>
-              <a:defRPr sz="2000"/>
-            </a:lvl3pPr>
-            <a:lvl4pPr>
-              <a:defRPr sz="1800"/>
-            </a:lvl4pPr>
-            <a:lvl5pPr>
-              <a:defRPr sz="1800"/>
-            </a:lvl5pPr>
-            <a:lvl6pPr>
-              <a:defRPr sz="1800"/>
-            </a:lvl6pPr>
-            <a:lvl7pPr>
-              <a:defRPr sz="1800"/>
-            </a:lvl7pPr>
-            <a:lvl8pPr>
-              <a:defRPr sz="1800"/>
-            </a:lvl8pPr>
-            <a:lvl9pPr>
-              <a:defRPr sz="1800"/>
-            </a:lvl9pPr>
-          </a:lstStyle>
+          <a:lstStyle/>
           <a:p>
             <a:pPr lvl="0"/>
             <a:r>
@@ -1253,7 +1321,13 @@
       </p:sp>
       <p:sp>
         <p:nvSpPr>
-          <p:cNvPr id="4" name="Content Placeholder 3"/>
+          <p:cNvPr id="4" name="Content Placeholder 3">
+            <a:extLst>
+              <a:ext uri="{FF2B5EF4-FFF2-40B4-BE49-F238E27FC236}">
+                <a16:creationId xmlns:a16="http://schemas.microsoft.com/office/drawing/2014/main" id="{5688A474-DB8B-3642-BF2C-553450F27266}"/>
+              </a:ext>
+            </a:extLst>
+          </p:cNvPr>
           <p:cNvSpPr>
             <a:spLocks noGrp="1"/>
           </p:cNvSpPr>
@@ -1263,41 +1337,13 @@
         </p:nvSpPr>
         <p:spPr>
           <a:xfrm>
-            <a:off x="4648200" y="1600200"/>
-            <a:ext cx="4038600" cy="4525963"/>
+            <a:off x="6172200" y="1825625"/>
+            <a:ext cx="5181600" cy="4351338"/>
           </a:xfrm>
         </p:spPr>
         <p:txBody>
           <a:bodyPr/>
-          <a:lstStyle>
-            <a:lvl1pPr>
-              <a:defRPr sz="2800"/>
-            </a:lvl1pPr>
-            <a:lvl2pPr>
-              <a:defRPr sz="2400"/>
-            </a:lvl2pPr>
-            <a:lvl3pPr>
-              <a:defRPr sz="2000"/>
-            </a:lvl3pPr>
-            <a:lvl4pPr>
-              <a:defRPr sz="1800"/>
-            </a:lvl4pPr>
-            <a:lvl5pPr>
-              <a:defRPr sz="1800"/>
-            </a:lvl5pPr>
-            <a:lvl6pPr>
-              <a:defRPr sz="1800"/>
-            </a:lvl6pPr>
-            <a:lvl7pPr>
-              <a:defRPr sz="1800"/>
-            </a:lvl7pPr>
-            <a:lvl8pPr>
-              <a:defRPr sz="1800"/>
-            </a:lvl8pPr>
-            <a:lvl9pPr>
-              <a:defRPr sz="1800"/>
-            </a:lvl9pPr>
-          </a:lstStyle>
+          <a:lstStyle/>
           <a:p>
             <a:pPr lvl="0"/>
             <a:r>
@@ -1337,7 +1383,13 @@
       </p:sp>
       <p:sp>
         <p:nvSpPr>
-          <p:cNvPr id="5" name="Date Placeholder 4"/>
+          <p:cNvPr id="5" name="Date Placeholder 4">
+            <a:extLst>
+              <a:ext uri="{FF2B5EF4-FFF2-40B4-BE49-F238E27FC236}">
+                <a16:creationId xmlns:a16="http://schemas.microsoft.com/office/drawing/2014/main" id="{4058EB6D-540F-4D41-9207-87EEE5EAA718}"/>
+              </a:ext>
+            </a:extLst>
+          </p:cNvPr>
           <p:cNvSpPr>
             <a:spLocks noGrp="1"/>
           </p:cNvSpPr>
@@ -1350,9 +1402,9 @@
           <a:bodyPr/>
           <a:lstStyle/>
           <a:p>
-            <a:fld id="{8698FBD9-E1C8-AC42-ACD5-5EE8B5256BDC}" type="datetimeFigureOut">
+            <a:fld id="{BCE50573-2E39-8C49-8B50-A4B8BEC2B519}" type="datetimeFigureOut">
               <a:rPr lang="en-US" smtClean="0"/>
-              <a:t>3/29/19</a:t>
+              <a:t>3/26/21</a:t>
             </a:fld>
             <a:endParaRPr lang="en-US"/>
           </a:p>
@@ -1360,7 +1412,13 @@
       </p:sp>
       <p:sp>
         <p:nvSpPr>
-          <p:cNvPr id="6" name="Footer Placeholder 5"/>
+          <p:cNvPr id="6" name="Footer Placeholder 5">
+            <a:extLst>
+              <a:ext uri="{FF2B5EF4-FFF2-40B4-BE49-F238E27FC236}">
+                <a16:creationId xmlns:a16="http://schemas.microsoft.com/office/drawing/2014/main" id="{6DDEA1BA-F991-FC4A-8AE2-32556F766961}"/>
+              </a:ext>
+            </a:extLst>
+          </p:cNvPr>
           <p:cNvSpPr>
             <a:spLocks noGrp="1"/>
           </p:cNvSpPr>
@@ -1379,7 +1437,13 @@
       </p:sp>
       <p:sp>
         <p:nvSpPr>
-          <p:cNvPr id="7" name="Slide Number Placeholder 6"/>
+          <p:cNvPr id="7" name="Slide Number Placeholder 6">
+            <a:extLst>
+              <a:ext uri="{FF2B5EF4-FFF2-40B4-BE49-F238E27FC236}">
+                <a16:creationId xmlns:a16="http://schemas.microsoft.com/office/drawing/2014/main" id="{DCF7ADAA-AFA8-4F4E-9EB3-82C7D70D4C8F}"/>
+              </a:ext>
+            </a:extLst>
+          </p:cNvPr>
           <p:cNvSpPr>
             <a:spLocks noGrp="1"/>
           </p:cNvSpPr>
@@ -1392,7 +1456,7 @@
           <a:bodyPr/>
           <a:lstStyle/>
           <a:p>
-            <a:fld id="{CF24EDC1-575E-7249-A6A7-C51D012F9C4F}" type="slidenum">
+            <a:fld id="{A000F695-1BFF-3442-9916-0DF25F28D045}" type="slidenum">
               <a:rPr lang="en-US" smtClean="0"/>
               <a:t>‹#›</a:t>
             </a:fld>
@@ -1403,7 +1467,7 @@
     </p:spTree>
     <p:extLst>
       <p:ext uri="{BB962C8B-B14F-4D97-AF65-F5344CB8AC3E}">
-        <p14:creationId xmlns:p14="http://schemas.microsoft.com/office/powerpoint/2010/main" val="895675827"/>
+        <p14:creationId xmlns:p14="http://schemas.microsoft.com/office/powerpoint/2010/main" val="2358670707"/>
       </p:ext>
     </p:extLst>
   </p:cSld>
@@ -1432,44 +1496,57 @@
       </p:grpSpPr>
       <p:sp>
         <p:nvSpPr>
-          <p:cNvPr id="2" name="Title 1"/>
+          <p:cNvPr id="2" name="Title 1">
+            <a:extLst>
+              <a:ext uri="{FF2B5EF4-FFF2-40B4-BE49-F238E27FC236}">
+                <a16:creationId xmlns:a16="http://schemas.microsoft.com/office/drawing/2014/main" id="{09FD4055-1056-1A4E-8C82-489A01D1B48D}"/>
+              </a:ext>
+            </a:extLst>
+          </p:cNvPr>
           <p:cNvSpPr>
             <a:spLocks noGrp="1"/>
           </p:cNvSpPr>
           <p:nvPr>
             <p:ph type="title"/>
-          </p:nvPr>
-        </p:nvSpPr>
-        <p:spPr/>
-        <p:txBody>
-          <a:bodyPr/>
-          <a:lstStyle>
-            <a:lvl1pPr>
-              <a:defRPr/>
-            </a:lvl1pPr>
-          </a:lstStyle>
-          <a:p>
-            <a:r>
-              <a:rPr lang="en-US"/>
-              <a:t>Click to edit Master title style</a:t>
-            </a:r>
-          </a:p>
-        </p:txBody>
-      </p:sp>
-      <p:sp>
-        <p:nvSpPr>
-          <p:cNvPr id="3" name="Text Placeholder 2"/>
-          <p:cNvSpPr>
-            <a:spLocks noGrp="1"/>
-          </p:cNvSpPr>
-          <p:nvPr>
-            <p:ph type="body" idx="1"/>
           </p:nvPr>
         </p:nvSpPr>
         <p:spPr>
           <a:xfrm>
-            <a:off x="457200" y="1535113"/>
-            <a:ext cx="4040188" cy="639762"/>
+            <a:off x="839788" y="365125"/>
+            <a:ext cx="10515600" cy="1325563"/>
+          </a:xfrm>
+        </p:spPr>
+        <p:txBody>
+          <a:bodyPr/>
+          <a:lstStyle/>
+          <a:p>
+            <a:r>
+              <a:rPr lang="en-US"/>
+              <a:t>Click to edit Master title style</a:t>
+            </a:r>
+          </a:p>
+        </p:txBody>
+      </p:sp>
+      <p:sp>
+        <p:nvSpPr>
+          <p:cNvPr id="3" name="Text Placeholder 2">
+            <a:extLst>
+              <a:ext uri="{FF2B5EF4-FFF2-40B4-BE49-F238E27FC236}">
+                <a16:creationId xmlns:a16="http://schemas.microsoft.com/office/drawing/2014/main" id="{5D5BA61C-5C29-D149-95E9-815A3B9DA0CE}"/>
+              </a:ext>
+            </a:extLst>
+          </p:cNvPr>
+          <p:cNvSpPr>
+            <a:spLocks noGrp="1"/>
+          </p:cNvSpPr>
+          <p:nvPr>
+            <p:ph type="body" idx="1"/>
+          </p:nvPr>
+        </p:nvSpPr>
+        <p:spPr>
+          <a:xfrm>
+            <a:off x="839788" y="1681163"/>
+            <a:ext cx="5157787" cy="823912"/>
           </a:xfrm>
         </p:spPr>
         <p:txBody>
@@ -1523,7 +1600,13 @@
       </p:sp>
       <p:sp>
         <p:nvSpPr>
-          <p:cNvPr id="4" name="Content Placeholder 3"/>
+          <p:cNvPr id="4" name="Content Placeholder 3">
+            <a:extLst>
+              <a:ext uri="{FF2B5EF4-FFF2-40B4-BE49-F238E27FC236}">
+                <a16:creationId xmlns:a16="http://schemas.microsoft.com/office/drawing/2014/main" id="{7353805F-6869-344F-886A-B134285E6BB9}"/>
+              </a:ext>
+            </a:extLst>
+          </p:cNvPr>
           <p:cNvSpPr>
             <a:spLocks noGrp="1"/>
           </p:cNvSpPr>
@@ -1533,41 +1616,13 @@
         </p:nvSpPr>
         <p:spPr>
           <a:xfrm>
-            <a:off x="457200" y="2174875"/>
-            <a:ext cx="4040188" cy="3951288"/>
+            <a:off x="839788" y="2505075"/>
+            <a:ext cx="5157787" cy="3684588"/>
           </a:xfrm>
         </p:spPr>
         <p:txBody>
           <a:bodyPr/>
-          <a:lstStyle>
-            <a:lvl1pPr>
-              <a:defRPr sz="2400"/>
-            </a:lvl1pPr>
-            <a:lvl2pPr>
-              <a:defRPr sz="2000"/>
-            </a:lvl2pPr>
-            <a:lvl3pPr>
-              <a:defRPr sz="1800"/>
-            </a:lvl3pPr>
-            <a:lvl4pPr>
-              <a:defRPr sz="1600"/>
-            </a:lvl4pPr>
-            <a:lvl5pPr>
-              <a:defRPr sz="1600"/>
-            </a:lvl5pPr>
-            <a:lvl6pPr>
-              <a:defRPr sz="1600"/>
-            </a:lvl6pPr>
-            <a:lvl7pPr>
-              <a:defRPr sz="1600"/>
-            </a:lvl7pPr>
-            <a:lvl8pPr>
-              <a:defRPr sz="1600"/>
-            </a:lvl8pPr>
-            <a:lvl9pPr>
-              <a:defRPr sz="1600"/>
-            </a:lvl9pPr>
-          </a:lstStyle>
+          <a:lstStyle/>
           <a:p>
             <a:pPr lvl="0"/>
             <a:r>
@@ -1607,7 +1662,13 @@
       </p:sp>
       <p:sp>
         <p:nvSpPr>
-          <p:cNvPr id="5" name="Text Placeholder 4"/>
+          <p:cNvPr id="5" name="Text Placeholder 4">
+            <a:extLst>
+              <a:ext uri="{FF2B5EF4-FFF2-40B4-BE49-F238E27FC236}">
+                <a16:creationId xmlns:a16="http://schemas.microsoft.com/office/drawing/2014/main" id="{66AD1D84-FFB3-3A44-8F32-358CC780ED37}"/>
+              </a:ext>
+            </a:extLst>
+          </p:cNvPr>
           <p:cNvSpPr>
             <a:spLocks noGrp="1"/>
           </p:cNvSpPr>
@@ -1617,8 +1678,8 @@
         </p:nvSpPr>
         <p:spPr>
           <a:xfrm>
-            <a:off x="4645025" y="1535113"/>
-            <a:ext cx="4041775" cy="639762"/>
+            <a:off x="6172200" y="1681163"/>
+            <a:ext cx="5183188" cy="823912"/>
           </a:xfrm>
         </p:spPr>
         <p:txBody>
@@ -1672,7 +1733,13 @@
       </p:sp>
       <p:sp>
         <p:nvSpPr>
-          <p:cNvPr id="6" name="Content Placeholder 5"/>
+          <p:cNvPr id="6" name="Content Placeholder 5">
+            <a:extLst>
+              <a:ext uri="{FF2B5EF4-FFF2-40B4-BE49-F238E27FC236}">
+                <a16:creationId xmlns:a16="http://schemas.microsoft.com/office/drawing/2014/main" id="{D35D42C0-3FEB-FC4C-A3CF-2622AA2B5DEF}"/>
+              </a:ext>
+            </a:extLst>
+          </p:cNvPr>
           <p:cNvSpPr>
             <a:spLocks noGrp="1"/>
           </p:cNvSpPr>
@@ -1682,41 +1749,13 @@
         </p:nvSpPr>
         <p:spPr>
           <a:xfrm>
-            <a:off x="4645025" y="2174875"/>
-            <a:ext cx="4041775" cy="3951288"/>
+            <a:off x="6172200" y="2505075"/>
+            <a:ext cx="5183188" cy="3684588"/>
           </a:xfrm>
         </p:spPr>
         <p:txBody>
           <a:bodyPr/>
-          <a:lstStyle>
-            <a:lvl1pPr>
-              <a:defRPr sz="2400"/>
-            </a:lvl1pPr>
-            <a:lvl2pPr>
-              <a:defRPr sz="2000"/>
-            </a:lvl2pPr>
-            <a:lvl3pPr>
-              <a:defRPr sz="1800"/>
-            </a:lvl3pPr>
-            <a:lvl4pPr>
-              <a:defRPr sz="1600"/>
-            </a:lvl4pPr>
-            <a:lvl5pPr>
-              <a:defRPr sz="1600"/>
-            </a:lvl5pPr>
-            <a:lvl6pPr>
-              <a:defRPr sz="1600"/>
-            </a:lvl6pPr>
-            <a:lvl7pPr>
-              <a:defRPr sz="1600"/>
-            </a:lvl7pPr>
-            <a:lvl8pPr>
-              <a:defRPr sz="1600"/>
-            </a:lvl8pPr>
-            <a:lvl9pPr>
-              <a:defRPr sz="1600"/>
-            </a:lvl9pPr>
-          </a:lstStyle>
+          <a:lstStyle/>
           <a:p>
             <a:pPr lvl="0"/>
             <a:r>
@@ -1756,7 +1795,13 @@
       </p:sp>
       <p:sp>
         <p:nvSpPr>
-          <p:cNvPr id="7" name="Date Placeholder 6"/>
+          <p:cNvPr id="7" name="Date Placeholder 6">
+            <a:extLst>
+              <a:ext uri="{FF2B5EF4-FFF2-40B4-BE49-F238E27FC236}">
+                <a16:creationId xmlns:a16="http://schemas.microsoft.com/office/drawing/2014/main" id="{5ECA7A04-CDFF-304F-B951-64F1A0DEDBFD}"/>
+              </a:ext>
+            </a:extLst>
+          </p:cNvPr>
           <p:cNvSpPr>
             <a:spLocks noGrp="1"/>
           </p:cNvSpPr>
@@ -1769,9 +1814,9 @@
           <a:bodyPr/>
           <a:lstStyle/>
           <a:p>
-            <a:fld id="{8698FBD9-E1C8-AC42-ACD5-5EE8B5256BDC}" type="datetimeFigureOut">
+            <a:fld id="{BCE50573-2E39-8C49-8B50-A4B8BEC2B519}" type="datetimeFigureOut">
               <a:rPr lang="en-US" smtClean="0"/>
-              <a:t>3/29/19</a:t>
+              <a:t>3/26/21</a:t>
             </a:fld>
             <a:endParaRPr lang="en-US"/>
           </a:p>
@@ -1779,7 +1824,13 @@
       </p:sp>
       <p:sp>
         <p:nvSpPr>
-          <p:cNvPr id="8" name="Footer Placeholder 7"/>
+          <p:cNvPr id="8" name="Footer Placeholder 7">
+            <a:extLst>
+              <a:ext uri="{FF2B5EF4-FFF2-40B4-BE49-F238E27FC236}">
+                <a16:creationId xmlns:a16="http://schemas.microsoft.com/office/drawing/2014/main" id="{B34BB810-BFC5-7A4F-BBED-33819F31D151}"/>
+              </a:ext>
+            </a:extLst>
+          </p:cNvPr>
           <p:cNvSpPr>
             <a:spLocks noGrp="1"/>
           </p:cNvSpPr>
@@ -1798,7 +1849,13 @@
       </p:sp>
       <p:sp>
         <p:nvSpPr>
-          <p:cNvPr id="9" name="Slide Number Placeholder 8"/>
+          <p:cNvPr id="9" name="Slide Number Placeholder 8">
+            <a:extLst>
+              <a:ext uri="{FF2B5EF4-FFF2-40B4-BE49-F238E27FC236}">
+                <a16:creationId xmlns:a16="http://schemas.microsoft.com/office/drawing/2014/main" id="{5C90EE3C-E131-DD4A-B9D0-7ECF118DD661}"/>
+              </a:ext>
+            </a:extLst>
+          </p:cNvPr>
           <p:cNvSpPr>
             <a:spLocks noGrp="1"/>
           </p:cNvSpPr>
@@ -1811,7 +1868,7 @@
           <a:bodyPr/>
           <a:lstStyle/>
           <a:p>
-            <a:fld id="{CF24EDC1-575E-7249-A6A7-C51D012F9C4F}" type="slidenum">
+            <a:fld id="{A000F695-1BFF-3442-9916-0DF25F28D045}" type="slidenum">
               <a:rPr lang="en-US" smtClean="0"/>
               <a:t>‹#›</a:t>
             </a:fld>
@@ -1822,7 +1879,7 @@
     </p:spTree>
     <p:extLst>
       <p:ext uri="{BB962C8B-B14F-4D97-AF65-F5344CB8AC3E}">
-        <p14:creationId xmlns:p14="http://schemas.microsoft.com/office/powerpoint/2010/main" val="3722796078"/>
+        <p14:creationId xmlns:p14="http://schemas.microsoft.com/office/powerpoint/2010/main" val="881365905"/>
       </p:ext>
     </p:extLst>
   </p:cSld>
@@ -1851,7 +1908,13 @@
       </p:grpSpPr>
       <p:sp>
         <p:nvSpPr>
-          <p:cNvPr id="2" name="Title 1"/>
+          <p:cNvPr id="2" name="Title 1">
+            <a:extLst>
+              <a:ext uri="{FF2B5EF4-FFF2-40B4-BE49-F238E27FC236}">
+                <a16:creationId xmlns:a16="http://schemas.microsoft.com/office/drawing/2014/main" id="{2AF9AE2E-15FD-E84E-9AC9-B0869D4E8B46}"/>
+              </a:ext>
+            </a:extLst>
+          </p:cNvPr>
           <p:cNvSpPr>
             <a:spLocks noGrp="1"/>
           </p:cNvSpPr>
@@ -1873,7 +1936,13 @@
       </p:sp>
       <p:sp>
         <p:nvSpPr>
-          <p:cNvPr id="3" name="Date Placeholder 2"/>
+          <p:cNvPr id="3" name="Date Placeholder 2">
+            <a:extLst>
+              <a:ext uri="{FF2B5EF4-FFF2-40B4-BE49-F238E27FC236}">
+                <a16:creationId xmlns:a16="http://schemas.microsoft.com/office/drawing/2014/main" id="{59145745-90DE-4649-959F-3BB521A1CF99}"/>
+              </a:ext>
+            </a:extLst>
+          </p:cNvPr>
           <p:cNvSpPr>
             <a:spLocks noGrp="1"/>
           </p:cNvSpPr>
@@ -1886,9 +1955,9 @@
           <a:bodyPr/>
           <a:lstStyle/>
           <a:p>
-            <a:fld id="{8698FBD9-E1C8-AC42-ACD5-5EE8B5256BDC}" type="datetimeFigureOut">
+            <a:fld id="{BCE50573-2E39-8C49-8B50-A4B8BEC2B519}" type="datetimeFigureOut">
               <a:rPr lang="en-US" smtClean="0"/>
-              <a:t>3/29/19</a:t>
+              <a:t>3/26/21</a:t>
             </a:fld>
             <a:endParaRPr lang="en-US"/>
           </a:p>
@@ -1896,7 +1965,13 @@
       </p:sp>
       <p:sp>
         <p:nvSpPr>
-          <p:cNvPr id="4" name="Footer Placeholder 3"/>
+          <p:cNvPr id="4" name="Footer Placeholder 3">
+            <a:extLst>
+              <a:ext uri="{FF2B5EF4-FFF2-40B4-BE49-F238E27FC236}">
+                <a16:creationId xmlns:a16="http://schemas.microsoft.com/office/drawing/2014/main" id="{1082EE3D-1921-BB45-B208-77CCF1F1BDC6}"/>
+              </a:ext>
+            </a:extLst>
+          </p:cNvPr>
           <p:cNvSpPr>
             <a:spLocks noGrp="1"/>
           </p:cNvSpPr>
@@ -1915,7 +1990,13 @@
       </p:sp>
       <p:sp>
         <p:nvSpPr>
-          <p:cNvPr id="5" name="Slide Number Placeholder 4"/>
+          <p:cNvPr id="5" name="Slide Number Placeholder 4">
+            <a:extLst>
+              <a:ext uri="{FF2B5EF4-FFF2-40B4-BE49-F238E27FC236}">
+                <a16:creationId xmlns:a16="http://schemas.microsoft.com/office/drawing/2014/main" id="{705B02FC-4A21-244B-A486-2E0A9472F7B6}"/>
+              </a:ext>
+            </a:extLst>
+          </p:cNvPr>
           <p:cNvSpPr>
             <a:spLocks noGrp="1"/>
           </p:cNvSpPr>
@@ -1928,7 +2009,7 @@
           <a:bodyPr/>
           <a:lstStyle/>
           <a:p>
-            <a:fld id="{CF24EDC1-575E-7249-A6A7-C51D012F9C4F}" type="slidenum">
+            <a:fld id="{A000F695-1BFF-3442-9916-0DF25F28D045}" type="slidenum">
               <a:rPr lang="en-US" smtClean="0"/>
               <a:t>‹#›</a:t>
             </a:fld>
@@ -1939,7 +2020,7 @@
     </p:spTree>
     <p:extLst>
       <p:ext uri="{BB962C8B-B14F-4D97-AF65-F5344CB8AC3E}">
-        <p14:creationId xmlns:p14="http://schemas.microsoft.com/office/powerpoint/2010/main" val="3775131902"/>
+        <p14:creationId xmlns:p14="http://schemas.microsoft.com/office/powerpoint/2010/main" val="2445948486"/>
       </p:ext>
     </p:extLst>
   </p:cSld>
@@ -1968,7 +2049,13 @@
       </p:grpSpPr>
       <p:sp>
         <p:nvSpPr>
-          <p:cNvPr id="2" name="Date Placeholder 1"/>
+          <p:cNvPr id="2" name="Date Placeholder 1">
+            <a:extLst>
+              <a:ext uri="{FF2B5EF4-FFF2-40B4-BE49-F238E27FC236}">
+                <a16:creationId xmlns:a16="http://schemas.microsoft.com/office/drawing/2014/main" id="{CC8A6A13-F12F-A748-B1A8-91A93F2EB611}"/>
+              </a:ext>
+            </a:extLst>
+          </p:cNvPr>
           <p:cNvSpPr>
             <a:spLocks noGrp="1"/>
           </p:cNvSpPr>
@@ -1981,9 +2068,9 @@
           <a:bodyPr/>
           <a:lstStyle/>
           <a:p>
-            <a:fld id="{8698FBD9-E1C8-AC42-ACD5-5EE8B5256BDC}" type="datetimeFigureOut">
+            <a:fld id="{BCE50573-2E39-8C49-8B50-A4B8BEC2B519}" type="datetimeFigureOut">
               <a:rPr lang="en-US" smtClean="0"/>
-              <a:t>3/29/19</a:t>
+              <a:t>3/26/21</a:t>
             </a:fld>
             <a:endParaRPr lang="en-US"/>
           </a:p>
@@ -1991,7 +2078,13 @@
       </p:sp>
       <p:sp>
         <p:nvSpPr>
-          <p:cNvPr id="3" name="Footer Placeholder 2"/>
+          <p:cNvPr id="3" name="Footer Placeholder 2">
+            <a:extLst>
+              <a:ext uri="{FF2B5EF4-FFF2-40B4-BE49-F238E27FC236}">
+                <a16:creationId xmlns:a16="http://schemas.microsoft.com/office/drawing/2014/main" id="{02C54689-CEF2-F245-B680-BF54F1C7D1C8}"/>
+              </a:ext>
+            </a:extLst>
+          </p:cNvPr>
           <p:cNvSpPr>
             <a:spLocks noGrp="1"/>
           </p:cNvSpPr>
@@ -2010,7 +2103,13 @@
       </p:sp>
       <p:sp>
         <p:nvSpPr>
-          <p:cNvPr id="4" name="Slide Number Placeholder 3"/>
+          <p:cNvPr id="4" name="Slide Number Placeholder 3">
+            <a:extLst>
+              <a:ext uri="{FF2B5EF4-FFF2-40B4-BE49-F238E27FC236}">
+                <a16:creationId xmlns:a16="http://schemas.microsoft.com/office/drawing/2014/main" id="{9638745B-B814-D540-B0DB-1966EA13E786}"/>
+              </a:ext>
+            </a:extLst>
+          </p:cNvPr>
           <p:cNvSpPr>
             <a:spLocks noGrp="1"/>
           </p:cNvSpPr>
@@ -2023,7 +2122,7 @@
           <a:bodyPr/>
           <a:lstStyle/>
           <a:p>
-            <a:fld id="{CF24EDC1-575E-7249-A6A7-C51D012F9C4F}" type="slidenum">
+            <a:fld id="{A000F695-1BFF-3442-9916-0DF25F28D045}" type="slidenum">
               <a:rPr lang="en-US" smtClean="0"/>
               <a:t>‹#›</a:t>
             </a:fld>
@@ -2034,7 +2133,7 @@
     </p:spTree>
     <p:extLst>
       <p:ext uri="{BB962C8B-B14F-4D97-AF65-F5344CB8AC3E}">
-        <p14:creationId xmlns:p14="http://schemas.microsoft.com/office/powerpoint/2010/main" val="1833694073"/>
+        <p14:creationId xmlns:p14="http://schemas.microsoft.com/office/powerpoint/2010/main" val="1122276980"/>
       </p:ext>
     </p:extLst>
   </p:cSld>
@@ -2063,7 +2162,13 @@
       </p:grpSpPr>
       <p:sp>
         <p:nvSpPr>
-          <p:cNvPr id="2" name="Title 1"/>
+          <p:cNvPr id="2" name="Title 1">
+            <a:extLst>
+              <a:ext uri="{FF2B5EF4-FFF2-40B4-BE49-F238E27FC236}">
+                <a16:creationId xmlns:a16="http://schemas.microsoft.com/office/drawing/2014/main" id="{0E10AB6D-6238-B340-B173-381F35B05B8C}"/>
+              </a:ext>
+            </a:extLst>
+          </p:cNvPr>
           <p:cNvSpPr>
             <a:spLocks noGrp="1"/>
           </p:cNvSpPr>
@@ -2073,15 +2178,15 @@
         </p:nvSpPr>
         <p:spPr>
           <a:xfrm>
-            <a:off x="457200" y="273050"/>
-            <a:ext cx="3008313" cy="1162050"/>
+            <a:off x="839788" y="457200"/>
+            <a:ext cx="3932237" cy="1600200"/>
           </a:xfrm>
         </p:spPr>
         <p:txBody>
           <a:bodyPr anchor="b"/>
           <a:lstStyle>
-            <a:lvl1pPr algn="l">
-              <a:defRPr sz="2000" b="1"/>
+            <a:lvl1pPr>
+              <a:defRPr sz="3200"/>
             </a:lvl1pPr>
           </a:lstStyle>
           <a:p>
@@ -2094,7 +2199,13 @@
       </p:sp>
       <p:sp>
         <p:nvSpPr>
-          <p:cNvPr id="3" name="Content Placeholder 2"/>
+          <p:cNvPr id="3" name="Content Placeholder 2">
+            <a:extLst>
+              <a:ext uri="{FF2B5EF4-FFF2-40B4-BE49-F238E27FC236}">
+                <a16:creationId xmlns:a16="http://schemas.microsoft.com/office/drawing/2014/main" id="{9E5F0499-0D03-4E4B-97A2-3B81EF2E563B}"/>
+              </a:ext>
+            </a:extLst>
+          </p:cNvPr>
           <p:cNvSpPr>
             <a:spLocks noGrp="1"/>
           </p:cNvSpPr>
@@ -2104,8 +2215,8 @@
         </p:nvSpPr>
         <p:spPr>
           <a:xfrm>
-            <a:off x="3575050" y="273050"/>
-            <a:ext cx="5111750" cy="5853113"/>
+            <a:off x="5183188" y="987425"/>
+            <a:ext cx="6172200" cy="4873625"/>
           </a:xfrm>
         </p:spPr>
         <p:txBody>
@@ -2178,7 +2289,13 @@
       </p:sp>
       <p:sp>
         <p:nvSpPr>
-          <p:cNvPr id="4" name="Text Placeholder 3"/>
+          <p:cNvPr id="4" name="Text Placeholder 3">
+            <a:extLst>
+              <a:ext uri="{FF2B5EF4-FFF2-40B4-BE49-F238E27FC236}">
+                <a16:creationId xmlns:a16="http://schemas.microsoft.com/office/drawing/2014/main" id="{280B0A19-13F0-8043-9FD1-B77416EB59EF}"/>
+              </a:ext>
+            </a:extLst>
+          </p:cNvPr>
           <p:cNvSpPr>
             <a:spLocks noGrp="1"/>
           </p:cNvSpPr>
@@ -2188,8 +2305,8 @@
         </p:nvSpPr>
         <p:spPr>
           <a:xfrm>
-            <a:off x="457200" y="1435100"/>
-            <a:ext cx="3008313" cy="4691063"/>
+            <a:off x="839788" y="2057400"/>
+            <a:ext cx="3932237" cy="3811588"/>
           </a:xfrm>
         </p:spPr>
         <p:txBody>
@@ -2197,39 +2314,39 @@
           <a:lstStyle>
             <a:lvl1pPr marL="0" indent="0">
               <a:buNone/>
-              <a:defRPr sz="1400"/>
+              <a:defRPr sz="1600"/>
             </a:lvl1pPr>
             <a:lvl2pPr marL="457200" indent="0">
               <a:buNone/>
-              <a:defRPr sz="1200"/>
+              <a:defRPr sz="1400"/>
             </a:lvl2pPr>
             <a:lvl3pPr marL="914400" indent="0">
               <a:buNone/>
-              <a:defRPr sz="1000"/>
+              <a:defRPr sz="1200"/>
             </a:lvl3pPr>
             <a:lvl4pPr marL="1371600" indent="0">
               <a:buNone/>
-              <a:defRPr sz="900"/>
+              <a:defRPr sz="1000"/>
             </a:lvl4pPr>
             <a:lvl5pPr marL="1828800" indent="0">
               <a:buNone/>
-              <a:defRPr sz="900"/>
+              <a:defRPr sz="1000"/>
             </a:lvl5pPr>
             <a:lvl6pPr marL="2286000" indent="0">
               <a:buNone/>
-              <a:defRPr sz="900"/>
+              <a:defRPr sz="1000"/>
             </a:lvl6pPr>
             <a:lvl7pPr marL="2743200" indent="0">
               <a:buNone/>
-              <a:defRPr sz="900"/>
+              <a:defRPr sz="1000"/>
             </a:lvl7pPr>
             <a:lvl8pPr marL="3200400" indent="0">
               <a:buNone/>
-              <a:defRPr sz="900"/>
+              <a:defRPr sz="1000"/>
             </a:lvl8pPr>
             <a:lvl9pPr marL="3657600" indent="0">
               <a:buNone/>
-              <a:defRPr sz="900"/>
+              <a:defRPr sz="1000"/>
             </a:lvl9pPr>
           </a:lstStyle>
           <a:p>
@@ -2243,7 +2360,13 @@
       </p:sp>
       <p:sp>
         <p:nvSpPr>
-          <p:cNvPr id="5" name="Date Placeholder 4"/>
+          <p:cNvPr id="5" name="Date Placeholder 4">
+            <a:extLst>
+              <a:ext uri="{FF2B5EF4-FFF2-40B4-BE49-F238E27FC236}">
+                <a16:creationId xmlns:a16="http://schemas.microsoft.com/office/drawing/2014/main" id="{F89D6870-F52E-8F49-94A1-6AE835E0627F}"/>
+              </a:ext>
+            </a:extLst>
+          </p:cNvPr>
           <p:cNvSpPr>
             <a:spLocks noGrp="1"/>
           </p:cNvSpPr>
@@ -2256,9 +2379,9 @@
           <a:bodyPr/>
           <a:lstStyle/>
           <a:p>
-            <a:fld id="{8698FBD9-E1C8-AC42-ACD5-5EE8B5256BDC}" type="datetimeFigureOut">
+            <a:fld id="{BCE50573-2E39-8C49-8B50-A4B8BEC2B519}" type="datetimeFigureOut">
               <a:rPr lang="en-US" smtClean="0"/>
-              <a:t>3/29/19</a:t>
+              <a:t>3/26/21</a:t>
             </a:fld>
             <a:endParaRPr lang="en-US"/>
           </a:p>
@@ -2266,7 +2389,13 @@
       </p:sp>
       <p:sp>
         <p:nvSpPr>
-          <p:cNvPr id="6" name="Footer Placeholder 5"/>
+          <p:cNvPr id="6" name="Footer Placeholder 5">
+            <a:extLst>
+              <a:ext uri="{FF2B5EF4-FFF2-40B4-BE49-F238E27FC236}">
+                <a16:creationId xmlns:a16="http://schemas.microsoft.com/office/drawing/2014/main" id="{15855937-ECEF-9F45-9A79-1F4E4BE418AA}"/>
+              </a:ext>
+            </a:extLst>
+          </p:cNvPr>
           <p:cNvSpPr>
             <a:spLocks noGrp="1"/>
           </p:cNvSpPr>
@@ -2285,7 +2414,13 @@
       </p:sp>
       <p:sp>
         <p:nvSpPr>
-          <p:cNvPr id="7" name="Slide Number Placeholder 6"/>
+          <p:cNvPr id="7" name="Slide Number Placeholder 6">
+            <a:extLst>
+              <a:ext uri="{FF2B5EF4-FFF2-40B4-BE49-F238E27FC236}">
+                <a16:creationId xmlns:a16="http://schemas.microsoft.com/office/drawing/2014/main" id="{11DAA27B-F77B-414B-99E4-90E7D14A93A6}"/>
+              </a:ext>
+            </a:extLst>
+          </p:cNvPr>
           <p:cNvSpPr>
             <a:spLocks noGrp="1"/>
           </p:cNvSpPr>
@@ -2298,7 +2433,7 @@
           <a:bodyPr/>
           <a:lstStyle/>
           <a:p>
-            <a:fld id="{CF24EDC1-575E-7249-A6A7-C51D012F9C4F}" type="slidenum">
+            <a:fld id="{A000F695-1BFF-3442-9916-0DF25F28D045}" type="slidenum">
               <a:rPr lang="en-US" smtClean="0"/>
               <a:t>‹#›</a:t>
             </a:fld>
@@ -2309,7 +2444,7 @@
     </p:spTree>
     <p:extLst>
       <p:ext uri="{BB962C8B-B14F-4D97-AF65-F5344CB8AC3E}">
-        <p14:creationId xmlns:p14="http://schemas.microsoft.com/office/powerpoint/2010/main" val="2346924046"/>
+        <p14:creationId xmlns:p14="http://schemas.microsoft.com/office/powerpoint/2010/main" val="3217867022"/>
       </p:ext>
     </p:extLst>
   </p:cSld>
@@ -2338,7 +2473,13 @@
       </p:grpSpPr>
       <p:sp>
         <p:nvSpPr>
-          <p:cNvPr id="2" name="Title 1"/>
+          <p:cNvPr id="2" name="Title 1">
+            <a:extLst>
+              <a:ext uri="{FF2B5EF4-FFF2-40B4-BE49-F238E27FC236}">
+                <a16:creationId xmlns:a16="http://schemas.microsoft.com/office/drawing/2014/main" id="{A4099333-F9C1-1A47-89CC-AC8E15B1D8BA}"/>
+              </a:ext>
+            </a:extLst>
+          </p:cNvPr>
           <p:cNvSpPr>
             <a:spLocks noGrp="1"/>
           </p:cNvSpPr>
@@ -2348,15 +2489,15 @@
         </p:nvSpPr>
         <p:spPr>
           <a:xfrm>
-            <a:off x="1792288" y="4800600"/>
-            <a:ext cx="5486400" cy="566738"/>
+            <a:off x="839788" y="457200"/>
+            <a:ext cx="3932237" cy="1600200"/>
           </a:xfrm>
         </p:spPr>
         <p:txBody>
           <a:bodyPr anchor="b"/>
           <a:lstStyle>
-            <a:lvl1pPr algn="l">
-              <a:defRPr sz="2000" b="1"/>
+            <a:lvl1pPr>
+              <a:defRPr sz="3200"/>
             </a:lvl1pPr>
           </a:lstStyle>
           <a:p>
@@ -2369,7 +2510,13 @@
       </p:sp>
       <p:sp>
         <p:nvSpPr>
-          <p:cNvPr id="3" name="Picture Placeholder 2"/>
+          <p:cNvPr id="3" name="Picture Placeholder 2">
+            <a:extLst>
+              <a:ext uri="{FF2B5EF4-FFF2-40B4-BE49-F238E27FC236}">
+                <a16:creationId xmlns:a16="http://schemas.microsoft.com/office/drawing/2014/main" id="{142E1FEA-9FCF-304F-9ED3-41E8779F3885}"/>
+              </a:ext>
+            </a:extLst>
+          </p:cNvPr>
           <p:cNvSpPr>
             <a:spLocks noGrp="1"/>
           </p:cNvSpPr>
@@ -2379,8 +2526,8 @@
         </p:nvSpPr>
         <p:spPr>
           <a:xfrm>
-            <a:off x="1792288" y="612775"/>
-            <a:ext cx="5486400" cy="4114800"/>
+            <a:off x="5183188" y="987425"/>
+            <a:ext cx="6172200" cy="4873625"/>
           </a:xfrm>
         </p:spPr>
         <p:txBody>
@@ -2430,7 +2577,13 @@
       </p:sp>
       <p:sp>
         <p:nvSpPr>
-          <p:cNvPr id="4" name="Text Placeholder 3"/>
+          <p:cNvPr id="4" name="Text Placeholder 3">
+            <a:extLst>
+              <a:ext uri="{FF2B5EF4-FFF2-40B4-BE49-F238E27FC236}">
+                <a16:creationId xmlns:a16="http://schemas.microsoft.com/office/drawing/2014/main" id="{B42FA325-E3E5-9340-BF31-F68CD74AB30E}"/>
+              </a:ext>
+            </a:extLst>
+          </p:cNvPr>
           <p:cNvSpPr>
             <a:spLocks noGrp="1"/>
           </p:cNvSpPr>
@@ -2440,8 +2593,8 @@
         </p:nvSpPr>
         <p:spPr>
           <a:xfrm>
-            <a:off x="1792288" y="5367338"/>
-            <a:ext cx="5486400" cy="804862"/>
+            <a:off x="839788" y="2057400"/>
+            <a:ext cx="3932237" cy="3811588"/>
           </a:xfrm>
         </p:spPr>
         <p:txBody>
@@ -2449,39 +2602,39 @@
           <a:lstStyle>
             <a:lvl1pPr marL="0" indent="0">
               <a:buNone/>
-              <a:defRPr sz="1400"/>
+              <a:defRPr sz="1600"/>
             </a:lvl1pPr>
             <a:lvl2pPr marL="457200" indent="0">
               <a:buNone/>
-              <a:defRPr sz="1200"/>
+              <a:defRPr sz="1400"/>
             </a:lvl2pPr>
             <a:lvl3pPr marL="914400" indent="0">
               <a:buNone/>
-              <a:defRPr sz="1000"/>
+              <a:defRPr sz="1200"/>
             </a:lvl3pPr>
             <a:lvl4pPr marL="1371600" indent="0">
               <a:buNone/>
-              <a:defRPr sz="900"/>
+              <a:defRPr sz="1000"/>
             </a:lvl4pPr>
             <a:lvl5pPr marL="1828800" indent="0">
               <a:buNone/>
-              <a:defRPr sz="900"/>
+              <a:defRPr sz="1000"/>
             </a:lvl5pPr>
             <a:lvl6pPr marL="2286000" indent="0">
               <a:buNone/>
-              <a:defRPr sz="900"/>
+              <a:defRPr sz="1000"/>
             </a:lvl6pPr>
             <a:lvl7pPr marL="2743200" indent="0">
               <a:buNone/>
-              <a:defRPr sz="900"/>
+              <a:defRPr sz="1000"/>
             </a:lvl7pPr>
             <a:lvl8pPr marL="3200400" indent="0">
               <a:buNone/>
-              <a:defRPr sz="900"/>
+              <a:defRPr sz="1000"/>
             </a:lvl8pPr>
             <a:lvl9pPr marL="3657600" indent="0">
               <a:buNone/>
-              <a:defRPr sz="900"/>
+              <a:defRPr sz="1000"/>
             </a:lvl9pPr>
           </a:lstStyle>
           <a:p>
@@ -2495,7 +2648,13 @@
       </p:sp>
       <p:sp>
         <p:nvSpPr>
-          <p:cNvPr id="5" name="Date Placeholder 4"/>
+          <p:cNvPr id="5" name="Date Placeholder 4">
+            <a:extLst>
+              <a:ext uri="{FF2B5EF4-FFF2-40B4-BE49-F238E27FC236}">
+                <a16:creationId xmlns:a16="http://schemas.microsoft.com/office/drawing/2014/main" id="{5746C95A-E9D8-7B4C-8263-7AABD8C464AD}"/>
+              </a:ext>
+            </a:extLst>
+          </p:cNvPr>
           <p:cNvSpPr>
             <a:spLocks noGrp="1"/>
           </p:cNvSpPr>
@@ -2508,9 +2667,9 @@
           <a:bodyPr/>
           <a:lstStyle/>
           <a:p>
-            <a:fld id="{8698FBD9-E1C8-AC42-ACD5-5EE8B5256BDC}" type="datetimeFigureOut">
+            <a:fld id="{BCE50573-2E39-8C49-8B50-A4B8BEC2B519}" type="datetimeFigureOut">
               <a:rPr lang="en-US" smtClean="0"/>
-              <a:t>3/29/19</a:t>
+              <a:t>3/26/21</a:t>
             </a:fld>
             <a:endParaRPr lang="en-US"/>
           </a:p>
@@ -2518,7 +2677,13 @@
       </p:sp>
       <p:sp>
         <p:nvSpPr>
-          <p:cNvPr id="6" name="Footer Placeholder 5"/>
+          <p:cNvPr id="6" name="Footer Placeholder 5">
+            <a:extLst>
+              <a:ext uri="{FF2B5EF4-FFF2-40B4-BE49-F238E27FC236}">
+                <a16:creationId xmlns:a16="http://schemas.microsoft.com/office/drawing/2014/main" id="{2CF0EB43-4F30-EB4D-A4EF-5E63F9E283F3}"/>
+              </a:ext>
+            </a:extLst>
+          </p:cNvPr>
           <p:cNvSpPr>
             <a:spLocks noGrp="1"/>
           </p:cNvSpPr>
@@ -2537,7 +2702,13 @@
       </p:sp>
       <p:sp>
         <p:nvSpPr>
-          <p:cNvPr id="7" name="Slide Number Placeholder 6"/>
+          <p:cNvPr id="7" name="Slide Number Placeholder 6">
+            <a:extLst>
+              <a:ext uri="{FF2B5EF4-FFF2-40B4-BE49-F238E27FC236}">
+                <a16:creationId xmlns:a16="http://schemas.microsoft.com/office/drawing/2014/main" id="{2FE732FB-9FE5-3E4F-9EAF-64B20F855BDE}"/>
+              </a:ext>
+            </a:extLst>
+          </p:cNvPr>
           <p:cNvSpPr>
             <a:spLocks noGrp="1"/>
           </p:cNvSpPr>
@@ -2550,7 +2721,7 @@
           <a:bodyPr/>
           <a:lstStyle/>
           <a:p>
-            <a:fld id="{CF24EDC1-575E-7249-A6A7-C51D012F9C4F}" type="slidenum">
+            <a:fld id="{A000F695-1BFF-3442-9916-0DF25F28D045}" type="slidenum">
               <a:rPr lang="en-US" smtClean="0"/>
               <a:t>‹#›</a:t>
             </a:fld>
@@ -2561,7 +2732,7 @@
     </p:spTree>
     <p:extLst>
       <p:ext uri="{BB962C8B-B14F-4D97-AF65-F5344CB8AC3E}">
-        <p14:creationId xmlns:p14="http://schemas.microsoft.com/office/powerpoint/2010/main" val="3334528783"/>
+        <p14:creationId xmlns:p14="http://schemas.microsoft.com/office/powerpoint/2010/main" val="3310313991"/>
       </p:ext>
     </p:extLst>
   </p:cSld>
@@ -2595,7 +2766,13 @@
       </p:grpSpPr>
       <p:sp>
         <p:nvSpPr>
-          <p:cNvPr id="2" name="Title Placeholder 1"/>
+          <p:cNvPr id="2" name="Title Placeholder 1">
+            <a:extLst>
+              <a:ext uri="{FF2B5EF4-FFF2-40B4-BE49-F238E27FC236}">
+                <a16:creationId xmlns:a16="http://schemas.microsoft.com/office/drawing/2014/main" id="{A4F775EA-5F5C-7344-A962-1698D20900B1}"/>
+              </a:ext>
+            </a:extLst>
+          </p:cNvPr>
           <p:cNvSpPr>
             <a:spLocks noGrp="1"/>
           </p:cNvSpPr>
@@ -2605,8 +2782,8 @@
         </p:nvSpPr>
         <p:spPr>
           <a:xfrm>
-            <a:off x="457200" y="274638"/>
-            <a:ext cx="8229600" cy="1143000"/>
+            <a:off x="838200" y="365125"/>
+            <a:ext cx="10515600" cy="1325563"/>
           </a:xfrm>
           <a:prstGeom prst="rect">
             <a:avLst/>
@@ -2619,7 +2796,7 @@
           <a:lstStyle/>
           <a:p>
             <a:r>
-              <a:rPr lang="en-US"/>
+              <a:rPr lang="en-US" dirty="0"/>
               <a:t>Click to edit Master title style</a:t>
             </a:r>
           </a:p>
@@ -2627,7 +2804,13 @@
       </p:sp>
       <p:sp>
         <p:nvSpPr>
-          <p:cNvPr id="3" name="Text Placeholder 2"/>
+          <p:cNvPr id="3" name="Text Placeholder 2">
+            <a:extLst>
+              <a:ext uri="{FF2B5EF4-FFF2-40B4-BE49-F238E27FC236}">
+                <a16:creationId xmlns:a16="http://schemas.microsoft.com/office/drawing/2014/main" id="{0F07CE26-024E-6945-A02B-EB27106E6DE0}"/>
+              </a:ext>
+            </a:extLst>
+          </p:cNvPr>
           <p:cNvSpPr>
             <a:spLocks noGrp="1"/>
           </p:cNvSpPr>
@@ -2637,8 +2820,8 @@
         </p:nvSpPr>
         <p:spPr>
           <a:xfrm>
-            <a:off x="457200" y="1600200"/>
-            <a:ext cx="8229600" cy="4525963"/>
+            <a:off x="838200" y="1825625"/>
+            <a:ext cx="10515600" cy="4351338"/>
           </a:xfrm>
           <a:prstGeom prst="rect">
             <a:avLst/>
@@ -2688,7 +2871,13 @@
       </p:sp>
       <p:sp>
         <p:nvSpPr>
-          <p:cNvPr id="4" name="Date Placeholder 3"/>
+          <p:cNvPr id="4" name="Date Placeholder 3">
+            <a:extLst>
+              <a:ext uri="{FF2B5EF4-FFF2-40B4-BE49-F238E27FC236}">
+                <a16:creationId xmlns:a16="http://schemas.microsoft.com/office/drawing/2014/main" id="{C4E93033-44FD-EF4B-B8A1-5B527FCAA7DC}"/>
+              </a:ext>
+            </a:extLst>
+          </p:cNvPr>
           <p:cNvSpPr>
             <a:spLocks noGrp="1"/>
           </p:cNvSpPr>
@@ -2698,8 +2887,8 @@
         </p:nvSpPr>
         <p:spPr>
           <a:xfrm>
-            <a:off x="457200" y="6356350"/>
-            <a:ext cx="2133600" cy="365125"/>
+            <a:off x="838200" y="6356350"/>
+            <a:ext cx="2743200" cy="365125"/>
           </a:xfrm>
           <a:prstGeom prst="rect">
             <a:avLst/>
@@ -2719,9 +2908,9 @@
             </a:lvl1pPr>
           </a:lstStyle>
           <a:p>
-            <a:fld id="{8698FBD9-E1C8-AC42-ACD5-5EE8B5256BDC}" type="datetimeFigureOut">
+            <a:fld id="{BCE50573-2E39-8C49-8B50-A4B8BEC2B519}" type="datetimeFigureOut">
               <a:rPr lang="en-US" smtClean="0"/>
-              <a:t>3/29/19</a:t>
+              <a:t>3/26/21</a:t>
             </a:fld>
             <a:endParaRPr lang="en-US"/>
           </a:p>
@@ -2729,7 +2918,13 @@
       </p:sp>
       <p:sp>
         <p:nvSpPr>
-          <p:cNvPr id="5" name="Footer Placeholder 4"/>
+          <p:cNvPr id="5" name="Footer Placeholder 4">
+            <a:extLst>
+              <a:ext uri="{FF2B5EF4-FFF2-40B4-BE49-F238E27FC236}">
+                <a16:creationId xmlns:a16="http://schemas.microsoft.com/office/drawing/2014/main" id="{EED34E93-BF6A-B04F-A2DD-62830787E4CB}"/>
+              </a:ext>
+            </a:extLst>
+          </p:cNvPr>
           <p:cNvSpPr>
             <a:spLocks noGrp="1"/>
           </p:cNvSpPr>
@@ -2739,8 +2934,8 @@
         </p:nvSpPr>
         <p:spPr>
           <a:xfrm>
-            <a:off x="3124200" y="6356350"/>
-            <a:ext cx="2895600" cy="365125"/>
+            <a:off x="4038600" y="6356350"/>
+            <a:ext cx="4114800" cy="365125"/>
           </a:xfrm>
           <a:prstGeom prst="rect">
             <a:avLst/>
@@ -2766,7 +2961,13 @@
       </p:sp>
       <p:sp>
         <p:nvSpPr>
-          <p:cNvPr id="6" name="Slide Number Placeholder 5"/>
+          <p:cNvPr id="6" name="Slide Number Placeholder 5">
+            <a:extLst>
+              <a:ext uri="{FF2B5EF4-FFF2-40B4-BE49-F238E27FC236}">
+                <a16:creationId xmlns:a16="http://schemas.microsoft.com/office/drawing/2014/main" id="{C169359E-0D66-D44A-9AB7-9C29735624B5}"/>
+              </a:ext>
+            </a:extLst>
+          </p:cNvPr>
           <p:cNvSpPr>
             <a:spLocks noGrp="1"/>
           </p:cNvSpPr>
@@ -2776,8 +2977,8 @@
         </p:nvSpPr>
         <p:spPr>
           <a:xfrm>
-            <a:off x="6553200" y="6356350"/>
-            <a:ext cx="2133600" cy="365125"/>
+            <a:off x="8610600" y="6356350"/>
+            <a:ext cx="2743200" cy="365125"/>
           </a:xfrm>
           <a:prstGeom prst="rect">
             <a:avLst/>
@@ -2797,7 +2998,7 @@
             </a:lvl1pPr>
           </a:lstStyle>
           <a:p>
-            <a:fld id="{CF24EDC1-575E-7249-A6A7-C51D012F9C4F}" type="slidenum">
+            <a:fld id="{A000F695-1BFF-3442-9916-0DF25F28D045}" type="slidenum">
               <a:rPr lang="en-US" smtClean="0"/>
               <a:t>‹#›</a:t>
             </a:fld>
@@ -2808,7 +3009,7 @@
     </p:spTree>
     <p:extLst>
       <p:ext uri="{BB962C8B-B14F-4D97-AF65-F5344CB8AC3E}">
-        <p14:creationId xmlns:p14="http://schemas.microsoft.com/office/powerpoint/2010/main" val="1291246976"/>
+        <p14:creationId xmlns:p14="http://schemas.microsoft.com/office/powerpoint/2010/main" val="204017227"/>
       </p:ext>
     </p:extLst>
   </p:cSld>
@@ -2828,7 +3029,10 @@
   </p:sldLayoutIdLst>
   <p:txStyles>
     <p:titleStyle>
-      <a:lvl1pPr algn="ctr" defTabSz="457200" rtl="0" eaLnBrk="1" latinLnBrk="0" hangingPunct="1">
+      <a:lvl1pPr algn="l" defTabSz="914400" rtl="0" eaLnBrk="1" latinLnBrk="0" hangingPunct="1">
+        <a:lnSpc>
+          <a:spcPct val="90000"/>
+        </a:lnSpc>
         <a:spcBef>
           <a:spcPct val="0"/>
         </a:spcBef>
@@ -2837,95 +3041,113 @@
           <a:solidFill>
             <a:schemeClr val="tx1"/>
           </a:solidFill>
-          <a:latin typeface="+mj-lt"/>
-          <a:ea typeface="+mj-ea"/>
-          <a:cs typeface="+mj-cs"/>
+          <a:latin typeface="Helvetica Neue" panose="02000503000000020004" pitchFamily="2" charset="0"/>
+          <a:ea typeface="Helvetica Neue" panose="02000503000000020004" pitchFamily="2" charset="0"/>
+          <a:cs typeface="Helvetica Neue" panose="02000503000000020004" pitchFamily="2" charset="0"/>
         </a:defRPr>
       </a:lvl1pPr>
     </p:titleStyle>
     <p:bodyStyle>
-      <a:lvl1pPr marL="342900" indent="-342900" algn="l" defTabSz="457200" rtl="0" eaLnBrk="1" latinLnBrk="0" hangingPunct="1">
+      <a:lvl1pPr marL="228600" indent="-228600" algn="l" defTabSz="914400" rtl="0" eaLnBrk="1" latinLnBrk="0" hangingPunct="1">
+        <a:lnSpc>
+          <a:spcPct val="90000"/>
+        </a:lnSpc>
         <a:spcBef>
-          <a:spcPct val="20000"/>
+          <a:spcPts val="1000"/>
         </a:spcBef>
-        <a:buFont typeface="Arial"/>
+        <a:buFont typeface="Arial" panose="020B0604020202020204" pitchFamily="34" charset="0"/>
         <a:buChar char="•"/>
-        <a:defRPr sz="3200" kern="1200">
-          <a:solidFill>
-            <a:schemeClr val="tx1"/>
-          </a:solidFill>
-          <a:latin typeface="+mn-lt"/>
-          <a:ea typeface="+mn-ea"/>
-          <a:cs typeface="+mn-cs"/>
-        </a:defRPr>
-      </a:lvl1pPr>
-      <a:lvl2pPr marL="742950" indent="-285750" algn="l" defTabSz="457200" rtl="0" eaLnBrk="1" latinLnBrk="0" hangingPunct="1">
-        <a:spcBef>
-          <a:spcPct val="20000"/>
-        </a:spcBef>
-        <a:buFont typeface="Arial"/>
-        <a:buChar char="–"/>
         <a:defRPr sz="2800" kern="1200">
           <a:solidFill>
             <a:schemeClr val="tx1"/>
           </a:solidFill>
-          <a:latin typeface="+mn-lt"/>
-          <a:ea typeface="+mn-ea"/>
-          <a:cs typeface="+mn-cs"/>
+          <a:latin typeface="Helvetica Neue" panose="02000503000000020004" pitchFamily="2" charset="0"/>
+          <a:ea typeface="Helvetica Neue" panose="02000503000000020004" pitchFamily="2" charset="0"/>
+          <a:cs typeface="Helvetica Neue" panose="02000503000000020004" pitchFamily="2" charset="0"/>
         </a:defRPr>
-      </a:lvl2pPr>
-      <a:lvl3pPr marL="1143000" indent="-228600" algn="l" defTabSz="457200" rtl="0" eaLnBrk="1" latinLnBrk="0" hangingPunct="1">
+      </a:lvl1pPr>
+      <a:lvl2pPr marL="685800" indent="-228600" algn="l" defTabSz="914400" rtl="0" eaLnBrk="1" latinLnBrk="0" hangingPunct="1">
+        <a:lnSpc>
+          <a:spcPct val="90000"/>
+        </a:lnSpc>
         <a:spcBef>
-          <a:spcPct val="20000"/>
+          <a:spcPts val="500"/>
         </a:spcBef>
-        <a:buFont typeface="Arial"/>
+        <a:buFont typeface="Arial" panose="020B0604020202020204" pitchFamily="34" charset="0"/>
         <a:buChar char="•"/>
         <a:defRPr sz="2400" kern="1200">
           <a:solidFill>
             <a:schemeClr val="tx1"/>
           </a:solidFill>
-          <a:latin typeface="+mn-lt"/>
-          <a:ea typeface="+mn-ea"/>
-          <a:cs typeface="+mn-cs"/>
+          <a:latin typeface="Helvetica Neue" panose="02000503000000020004" pitchFamily="2" charset="0"/>
+          <a:ea typeface="Helvetica Neue" panose="02000503000000020004" pitchFamily="2" charset="0"/>
+          <a:cs typeface="Helvetica Neue" panose="02000503000000020004" pitchFamily="2" charset="0"/>
         </a:defRPr>
-      </a:lvl3pPr>
-      <a:lvl4pPr marL="1600200" indent="-228600" algn="l" defTabSz="457200" rtl="0" eaLnBrk="1" latinLnBrk="0" hangingPunct="1">
+      </a:lvl2pPr>
+      <a:lvl3pPr marL="1143000" indent="-228600" algn="l" defTabSz="914400" rtl="0" eaLnBrk="1" latinLnBrk="0" hangingPunct="1">
+        <a:lnSpc>
+          <a:spcPct val="90000"/>
+        </a:lnSpc>
         <a:spcBef>
-          <a:spcPct val="20000"/>
+          <a:spcPts val="500"/>
         </a:spcBef>
-        <a:buFont typeface="Arial"/>
-        <a:buChar char="–"/>
+        <a:buFont typeface="Arial" panose="020B0604020202020204" pitchFamily="34" charset="0"/>
+        <a:buChar char="•"/>
         <a:defRPr sz="2000" kern="1200">
           <a:solidFill>
             <a:schemeClr val="tx1"/>
           </a:solidFill>
-          <a:latin typeface="+mn-lt"/>
-          <a:ea typeface="+mn-ea"/>
-          <a:cs typeface="+mn-cs"/>
+          <a:latin typeface="Helvetica Neue" panose="02000503000000020004" pitchFamily="2" charset="0"/>
+          <a:ea typeface="Helvetica Neue" panose="02000503000000020004" pitchFamily="2" charset="0"/>
+          <a:cs typeface="Helvetica Neue" panose="02000503000000020004" pitchFamily="2" charset="0"/>
         </a:defRPr>
-      </a:lvl4pPr>
-      <a:lvl5pPr marL="2057400" indent="-228600" algn="l" defTabSz="457200" rtl="0" eaLnBrk="1" latinLnBrk="0" hangingPunct="1">
+      </a:lvl3pPr>
+      <a:lvl4pPr marL="1600200" indent="-228600" algn="l" defTabSz="914400" rtl="0" eaLnBrk="1" latinLnBrk="0" hangingPunct="1">
+        <a:lnSpc>
+          <a:spcPct val="90000"/>
+        </a:lnSpc>
         <a:spcBef>
-          <a:spcPct val="20000"/>
+          <a:spcPts val="500"/>
         </a:spcBef>
-        <a:buFont typeface="Arial"/>
-        <a:buChar char="»"/>
-        <a:defRPr sz="2000" kern="1200">
+        <a:buFont typeface="Arial" panose="020B0604020202020204" pitchFamily="34" charset="0"/>
+        <a:buChar char="•"/>
+        <a:defRPr sz="1800" kern="1200">
           <a:solidFill>
             <a:schemeClr val="tx1"/>
           </a:solidFill>
-          <a:latin typeface="+mn-lt"/>
-          <a:ea typeface="+mn-ea"/>
-          <a:cs typeface="+mn-cs"/>
+          <a:latin typeface="Helvetica Neue" panose="02000503000000020004" pitchFamily="2" charset="0"/>
+          <a:ea typeface="Helvetica Neue" panose="02000503000000020004" pitchFamily="2" charset="0"/>
+          <a:cs typeface="Helvetica Neue" panose="02000503000000020004" pitchFamily="2" charset="0"/>
+        </a:defRPr>
+      </a:lvl4pPr>
+      <a:lvl5pPr marL="2057400" indent="-228600" algn="l" defTabSz="914400" rtl="0" eaLnBrk="1" latinLnBrk="0" hangingPunct="1">
+        <a:lnSpc>
+          <a:spcPct val="90000"/>
+        </a:lnSpc>
+        <a:spcBef>
+          <a:spcPts val="500"/>
+        </a:spcBef>
+        <a:buFont typeface="Arial" panose="020B0604020202020204" pitchFamily="34" charset="0"/>
+        <a:buChar char="•"/>
+        <a:defRPr sz="1800" kern="1200">
+          <a:solidFill>
+            <a:schemeClr val="tx1"/>
+          </a:solidFill>
+          <a:latin typeface="Helvetica Neue" panose="02000503000000020004" pitchFamily="2" charset="0"/>
+          <a:ea typeface="Helvetica Neue" panose="02000503000000020004" pitchFamily="2" charset="0"/>
+          <a:cs typeface="Helvetica Neue" panose="02000503000000020004" pitchFamily="2" charset="0"/>
         </a:defRPr>
       </a:lvl5pPr>
-      <a:lvl6pPr marL="2514600" indent="-228600" algn="l" defTabSz="457200" rtl="0" eaLnBrk="1" latinLnBrk="0" hangingPunct="1">
+      <a:lvl6pPr marL="2514600" indent="-228600" algn="l" defTabSz="914400" rtl="0" eaLnBrk="1" latinLnBrk="0" hangingPunct="1">
+        <a:lnSpc>
+          <a:spcPct val="90000"/>
+        </a:lnSpc>
         <a:spcBef>
-          <a:spcPct val="20000"/>
+          <a:spcPts val="500"/>
         </a:spcBef>
-        <a:buFont typeface="Arial"/>
+        <a:buFont typeface="Arial" panose="020B0604020202020204" pitchFamily="34" charset="0"/>
         <a:buChar char="•"/>
-        <a:defRPr sz="2000" kern="1200">
+        <a:defRPr sz="1800" kern="1200">
           <a:solidFill>
             <a:schemeClr val="tx1"/>
           </a:solidFill>
@@ -2934,13 +3156,16 @@
           <a:cs typeface="+mn-cs"/>
         </a:defRPr>
       </a:lvl6pPr>
-      <a:lvl7pPr marL="2971800" indent="-228600" algn="l" defTabSz="457200" rtl="0" eaLnBrk="1" latinLnBrk="0" hangingPunct="1">
+      <a:lvl7pPr marL="2971800" indent="-228600" algn="l" defTabSz="914400" rtl="0" eaLnBrk="1" latinLnBrk="0" hangingPunct="1">
+        <a:lnSpc>
+          <a:spcPct val="90000"/>
+        </a:lnSpc>
         <a:spcBef>
-          <a:spcPct val="20000"/>
+          <a:spcPts val="500"/>
         </a:spcBef>
-        <a:buFont typeface="Arial"/>
+        <a:buFont typeface="Arial" panose="020B0604020202020204" pitchFamily="34" charset="0"/>
         <a:buChar char="•"/>
-        <a:defRPr sz="2000" kern="1200">
+        <a:defRPr sz="1800" kern="1200">
           <a:solidFill>
             <a:schemeClr val="tx1"/>
           </a:solidFill>
@@ -2949,13 +3174,16 @@
           <a:cs typeface="+mn-cs"/>
         </a:defRPr>
       </a:lvl7pPr>
-      <a:lvl8pPr marL="3429000" indent="-228600" algn="l" defTabSz="457200" rtl="0" eaLnBrk="1" latinLnBrk="0" hangingPunct="1">
+      <a:lvl8pPr marL="3429000" indent="-228600" algn="l" defTabSz="914400" rtl="0" eaLnBrk="1" latinLnBrk="0" hangingPunct="1">
+        <a:lnSpc>
+          <a:spcPct val="90000"/>
+        </a:lnSpc>
         <a:spcBef>
-          <a:spcPct val="20000"/>
+          <a:spcPts val="500"/>
         </a:spcBef>
-        <a:buFont typeface="Arial"/>
+        <a:buFont typeface="Arial" panose="020B0604020202020204" pitchFamily="34" charset="0"/>
         <a:buChar char="•"/>
-        <a:defRPr sz="2000" kern="1200">
+        <a:defRPr sz="1800" kern="1200">
           <a:solidFill>
             <a:schemeClr val="tx1"/>
           </a:solidFill>
@@ -2964,13 +3192,16 @@
           <a:cs typeface="+mn-cs"/>
         </a:defRPr>
       </a:lvl8pPr>
-      <a:lvl9pPr marL="3886200" indent="-228600" algn="l" defTabSz="457200" rtl="0" eaLnBrk="1" latinLnBrk="0" hangingPunct="1">
+      <a:lvl9pPr marL="3886200" indent="-228600" algn="l" defTabSz="914400" rtl="0" eaLnBrk="1" latinLnBrk="0" hangingPunct="1">
+        <a:lnSpc>
+          <a:spcPct val="90000"/>
+        </a:lnSpc>
         <a:spcBef>
-          <a:spcPct val="20000"/>
+          <a:spcPts val="500"/>
         </a:spcBef>
-        <a:buFont typeface="Arial"/>
+        <a:buFont typeface="Arial" panose="020B0604020202020204" pitchFamily="34" charset="0"/>
         <a:buChar char="•"/>
-        <a:defRPr sz="2000" kern="1200">
+        <a:defRPr sz="1800" kern="1200">
           <a:solidFill>
             <a:schemeClr val="tx1"/>
           </a:solidFill>
@@ -2984,7 +3215,7 @@
       <a:defPPr>
         <a:defRPr lang="en-US"/>
       </a:defPPr>
-      <a:lvl1pPr marL="0" algn="l" defTabSz="457200" rtl="0" eaLnBrk="1" latinLnBrk="0" hangingPunct="1">
+      <a:lvl1pPr marL="0" algn="l" defTabSz="914400" rtl="0" eaLnBrk="1" latinLnBrk="0" hangingPunct="1">
         <a:defRPr sz="1800" kern="1200">
           <a:solidFill>
             <a:schemeClr val="tx1"/>
@@ -2994,7 +3225,7 @@
           <a:cs typeface="+mn-cs"/>
         </a:defRPr>
       </a:lvl1pPr>
-      <a:lvl2pPr marL="457200" algn="l" defTabSz="457200" rtl="0" eaLnBrk="1" latinLnBrk="0" hangingPunct="1">
+      <a:lvl2pPr marL="457200" algn="l" defTabSz="914400" rtl="0" eaLnBrk="1" latinLnBrk="0" hangingPunct="1">
         <a:defRPr sz="1800" kern="1200">
           <a:solidFill>
             <a:schemeClr val="tx1"/>
@@ -3004,7 +3235,7 @@
           <a:cs typeface="+mn-cs"/>
         </a:defRPr>
       </a:lvl2pPr>
-      <a:lvl3pPr marL="914400" algn="l" defTabSz="457200" rtl="0" eaLnBrk="1" latinLnBrk="0" hangingPunct="1">
+      <a:lvl3pPr marL="914400" algn="l" defTabSz="914400" rtl="0" eaLnBrk="1" latinLnBrk="0" hangingPunct="1">
         <a:defRPr sz="1800" kern="1200">
           <a:solidFill>
             <a:schemeClr val="tx1"/>
@@ -3014,7 +3245,7 @@
           <a:cs typeface="+mn-cs"/>
         </a:defRPr>
       </a:lvl3pPr>
-      <a:lvl4pPr marL="1371600" algn="l" defTabSz="457200" rtl="0" eaLnBrk="1" latinLnBrk="0" hangingPunct="1">
+      <a:lvl4pPr marL="1371600" algn="l" defTabSz="914400" rtl="0" eaLnBrk="1" latinLnBrk="0" hangingPunct="1">
         <a:defRPr sz="1800" kern="1200">
           <a:solidFill>
             <a:schemeClr val="tx1"/>
@@ -3024,7 +3255,7 @@
           <a:cs typeface="+mn-cs"/>
         </a:defRPr>
       </a:lvl4pPr>
-      <a:lvl5pPr marL="1828800" algn="l" defTabSz="457200" rtl="0" eaLnBrk="1" latinLnBrk="0" hangingPunct="1">
+      <a:lvl5pPr marL="1828800" algn="l" defTabSz="914400" rtl="0" eaLnBrk="1" latinLnBrk="0" hangingPunct="1">
         <a:defRPr sz="1800" kern="1200">
           <a:solidFill>
             <a:schemeClr val="tx1"/>
@@ -3034,7 +3265,7 @@
           <a:cs typeface="+mn-cs"/>
         </a:defRPr>
       </a:lvl5pPr>
-      <a:lvl6pPr marL="2286000" algn="l" defTabSz="457200" rtl="0" eaLnBrk="1" latinLnBrk="0" hangingPunct="1">
+      <a:lvl6pPr marL="2286000" algn="l" defTabSz="914400" rtl="0" eaLnBrk="1" latinLnBrk="0" hangingPunct="1">
         <a:defRPr sz="1800" kern="1200">
           <a:solidFill>
             <a:schemeClr val="tx1"/>
@@ -3044,7 +3275,7 @@
           <a:cs typeface="+mn-cs"/>
         </a:defRPr>
       </a:lvl6pPr>
-      <a:lvl7pPr marL="2743200" algn="l" defTabSz="457200" rtl="0" eaLnBrk="1" latinLnBrk="0" hangingPunct="1">
+      <a:lvl7pPr marL="2743200" algn="l" defTabSz="914400" rtl="0" eaLnBrk="1" latinLnBrk="0" hangingPunct="1">
         <a:defRPr sz="1800" kern="1200">
           <a:solidFill>
             <a:schemeClr val="tx1"/>
@@ -3054,7 +3285,7 @@
           <a:cs typeface="+mn-cs"/>
         </a:defRPr>
       </a:lvl7pPr>
-      <a:lvl8pPr marL="3200400" algn="l" defTabSz="457200" rtl="0" eaLnBrk="1" latinLnBrk="0" hangingPunct="1">
+      <a:lvl8pPr marL="3200400" algn="l" defTabSz="914400" rtl="0" eaLnBrk="1" latinLnBrk="0" hangingPunct="1">
         <a:defRPr sz="1800" kern="1200">
           <a:solidFill>
             <a:schemeClr val="tx1"/>
@@ -3064,7 +3295,7 @@
           <a:cs typeface="+mn-cs"/>
         </a:defRPr>
       </a:lvl8pPr>
-      <a:lvl9pPr marL="3657600" algn="l" defTabSz="457200" rtl="0" eaLnBrk="1" latinLnBrk="0" hangingPunct="1">
+      <a:lvl9pPr marL="3657600" algn="l" defTabSz="914400" rtl="0" eaLnBrk="1" latinLnBrk="0" hangingPunct="1">
         <a:defRPr sz="1800" kern="1200">
           <a:solidFill>
             <a:schemeClr val="tx1"/>
@@ -3619,7 +3850,10 @@
           <a:bodyPr/>
           <a:lstStyle/>
           <a:p>
-            <a:endParaRPr lang="en-US" dirty="0"/>
+            <a:r>
+              <a:rPr lang="en-US" dirty="0"/>
+              <a:t>I will know my project is a success if …</a:t>
+            </a:r>
           </a:p>
         </p:txBody>
       </p:sp>
@@ -3647,44 +3881,44 @@
         <a:sysClr val="window" lastClr="FFFFFF"/>
       </a:lt1>
       <a:dk2>
-        <a:srgbClr val="1F497D"/>
+        <a:srgbClr val="44546A"/>
       </a:dk2>
       <a:lt2>
-        <a:srgbClr val="EEECE1"/>
+        <a:srgbClr val="E7E6E6"/>
       </a:lt2>
       <a:accent1>
-        <a:srgbClr val="4F81BD"/>
+        <a:srgbClr val="4472C4"/>
       </a:accent1>
       <a:accent2>
-        <a:srgbClr val="C0504D"/>
+        <a:srgbClr val="ED7D31"/>
       </a:accent2>
       <a:accent3>
-        <a:srgbClr val="9BBB59"/>
+        <a:srgbClr val="A5A5A5"/>
       </a:accent3>
       <a:accent4>
-        <a:srgbClr val="8064A2"/>
+        <a:srgbClr val="FFC000"/>
       </a:accent4>
       <a:accent5>
-        <a:srgbClr val="4BACC6"/>
+        <a:srgbClr val="5B9BD5"/>
       </a:accent5>
       <a:accent6>
-        <a:srgbClr val="F79646"/>
+        <a:srgbClr val="70AD47"/>
       </a:accent6>
       <a:hlink>
-        <a:srgbClr val="0000FF"/>
+        <a:srgbClr val="0563C1"/>
       </a:hlink>
       <a:folHlink>
-        <a:srgbClr val="800080"/>
+        <a:srgbClr val="954F72"/>
       </a:folHlink>
     </a:clrScheme>
     <a:fontScheme name="Office">
       <a:majorFont>
-        <a:latin typeface="Calibri"/>
+        <a:latin typeface="Calibri Light" panose="020F0302020204030204"/>
         <a:ea typeface=""/>
         <a:cs typeface=""/>
-        <a:font script="Jpan" typeface="ＭＳ Ｐゴシック"/>
+        <a:font script="Jpan" typeface="游ゴシック Light"/>
         <a:font script="Hang" typeface="맑은 고딕"/>
-        <a:font script="Hans" typeface="宋体"/>
+        <a:font script="Hans" typeface="等线 Light"/>
         <a:font script="Hant" typeface="新細明體"/>
         <a:font script="Arab" typeface="Times New Roman"/>
         <a:font script="Hebr" typeface="Times New Roman"/>
@@ -3712,14 +3946,31 @@
         <a:font script="Viet" typeface="Times New Roman"/>
         <a:font script="Uigh" typeface="Microsoft Uighur"/>
         <a:font script="Geor" typeface="Sylfaen"/>
+        <a:font script="Armn" typeface="Arial"/>
+        <a:font script="Bugi" typeface="Leelawadee UI"/>
+        <a:font script="Bopo" typeface="Microsoft JhengHei"/>
+        <a:font script="Java" typeface="Javanese Text"/>
+        <a:font script="Lisu" typeface="Segoe UI"/>
+        <a:font script="Mymr" typeface="Myanmar Text"/>
+        <a:font script="Nkoo" typeface="Ebrima"/>
+        <a:font script="Olck" typeface="Nirmala UI"/>
+        <a:font script="Osma" typeface="Ebrima"/>
+        <a:font script="Phag" typeface="Phagspa"/>
+        <a:font script="Syrn" typeface="Estrangelo Edessa"/>
+        <a:font script="Syrj" typeface="Estrangelo Edessa"/>
+        <a:font script="Syre" typeface="Estrangelo Edessa"/>
+        <a:font script="Sora" typeface="Nirmala UI"/>
+        <a:font script="Tale" typeface="Microsoft Tai Le"/>
+        <a:font script="Talu" typeface="Microsoft New Tai Lue"/>
+        <a:font script="Tfng" typeface="Ebrima"/>
       </a:majorFont>
       <a:minorFont>
-        <a:latin typeface="Calibri"/>
+        <a:latin typeface="Calibri" panose="020F0502020204030204"/>
         <a:ea typeface=""/>
         <a:cs typeface=""/>
-        <a:font script="Jpan" typeface="ＭＳ Ｐゴシック"/>
+        <a:font script="Jpan" typeface="游ゴシック"/>
         <a:font script="Hang" typeface="맑은 고딕"/>
-        <a:font script="Hans" typeface="宋体"/>
+        <a:font script="Hans" typeface="等线"/>
         <a:font script="Hant" typeface="新細明體"/>
         <a:font script="Arab" typeface="Arial"/>
         <a:font script="Hebr" typeface="Arial"/>
@@ -3747,6 +3998,23 @@
         <a:font script="Viet" typeface="Arial"/>
         <a:font script="Uigh" typeface="Microsoft Uighur"/>
         <a:font script="Geor" typeface="Sylfaen"/>
+        <a:font script="Armn" typeface="Arial"/>
+        <a:font script="Bugi" typeface="Leelawadee UI"/>
+        <a:font script="Bopo" typeface="Microsoft JhengHei"/>
+        <a:font script="Java" typeface="Javanese Text"/>
+        <a:font script="Lisu" typeface="Segoe UI"/>
+        <a:font script="Mymr" typeface="Myanmar Text"/>
+        <a:font script="Nkoo" typeface="Ebrima"/>
+        <a:font script="Olck" typeface="Nirmala UI"/>
+        <a:font script="Osma" typeface="Ebrima"/>
+        <a:font script="Phag" typeface="Phagspa"/>
+        <a:font script="Syrn" typeface="Estrangelo Edessa"/>
+        <a:font script="Syrj" typeface="Estrangelo Edessa"/>
+        <a:font script="Syre" typeface="Estrangelo Edessa"/>
+        <a:font script="Sora" typeface="Nirmala UI"/>
+        <a:font script="Tale" typeface="Microsoft Tai Le"/>
+        <a:font script="Talu" typeface="Microsoft New Tai Lue"/>
+        <a:font script="Tfng" typeface="Ebrima"/>
       </a:minorFont>
     </a:fontScheme>
     <a:fmtScheme name="Office">
@@ -3758,200 +4026,141 @@
           <a:gsLst>
             <a:gs pos="0">
               <a:schemeClr val="phClr">
-                <a:tint val="50000"/>
-                <a:satMod val="300000"/>
+                <a:lumMod val="110000"/>
+                <a:satMod val="105000"/>
+                <a:tint val="67000"/>
               </a:schemeClr>
             </a:gs>
-            <a:gs pos="35000">
+            <a:gs pos="50000">
               <a:schemeClr val="phClr">
-                <a:tint val="37000"/>
-                <a:satMod val="300000"/>
+                <a:lumMod val="105000"/>
+                <a:satMod val="103000"/>
+                <a:tint val="73000"/>
               </a:schemeClr>
             </a:gs>
             <a:gs pos="100000">
               <a:schemeClr val="phClr">
-                <a:tint val="15000"/>
-                <a:satMod val="350000"/>
+                <a:lumMod val="105000"/>
+                <a:satMod val="109000"/>
+                <a:tint val="81000"/>
               </a:schemeClr>
             </a:gs>
           </a:gsLst>
-          <a:lin ang="16200000" scaled="1"/>
+          <a:lin ang="5400000" scaled="0"/>
         </a:gradFill>
         <a:gradFill rotWithShape="1">
           <a:gsLst>
             <a:gs pos="0">
               <a:schemeClr val="phClr">
-                <a:tint val="100000"/>
+                <a:satMod val="103000"/>
+                <a:lumMod val="102000"/>
+                <a:tint val="94000"/>
+              </a:schemeClr>
+            </a:gs>
+            <a:gs pos="50000">
+              <a:schemeClr val="phClr">
+                <a:satMod val="110000"/>
+                <a:lumMod val="100000"/>
                 <a:shade val="100000"/>
-                <a:satMod val="130000"/>
               </a:schemeClr>
             </a:gs>
             <a:gs pos="100000">
               <a:schemeClr val="phClr">
-                <a:tint val="50000"/>
-                <a:shade val="100000"/>
-                <a:satMod val="350000"/>
+                <a:lumMod val="99000"/>
+                <a:satMod val="120000"/>
+                <a:shade val="78000"/>
               </a:schemeClr>
             </a:gs>
           </a:gsLst>
-          <a:lin ang="16200000" scaled="0"/>
+          <a:lin ang="5400000" scaled="0"/>
         </a:gradFill>
       </a:fillStyleLst>
       <a:lnStyleLst>
-        <a:ln w="9525" cap="flat" cmpd="sng" algn="ctr">
-          <a:solidFill>
-            <a:schemeClr val="phClr">
-              <a:shade val="95000"/>
-              <a:satMod val="105000"/>
-            </a:schemeClr>
-          </a:solidFill>
-          <a:prstDash val="solid"/>
-        </a:ln>
-        <a:ln w="25400" cap="flat" cmpd="sng" algn="ctr">
+        <a:ln w="6350" cap="flat" cmpd="sng" algn="ctr">
           <a:solidFill>
             <a:schemeClr val="phClr"/>
           </a:solidFill>
           <a:prstDash val="solid"/>
+          <a:miter lim="800000"/>
         </a:ln>
-        <a:ln w="38100" cap="flat" cmpd="sng" algn="ctr">
+        <a:ln w="12700" cap="flat" cmpd="sng" algn="ctr">
           <a:solidFill>
             <a:schemeClr val="phClr"/>
           </a:solidFill>
           <a:prstDash val="solid"/>
+          <a:miter lim="800000"/>
+        </a:ln>
+        <a:ln w="19050" cap="flat" cmpd="sng" algn="ctr">
+          <a:solidFill>
+            <a:schemeClr val="phClr"/>
+          </a:solidFill>
+          <a:prstDash val="solid"/>
+          <a:miter lim="800000"/>
         </a:ln>
       </a:lnStyleLst>
       <a:effectStyleLst>
         <a:effectStyle>
+          <a:effectLst/>
+        </a:effectStyle>
+        <a:effectStyle>
+          <a:effectLst/>
+        </a:effectStyle>
+        <a:effectStyle>
           <a:effectLst>
-            <a:outerShdw blurRad="40000" dist="20000" dir="5400000" rotWithShape="0">
+            <a:outerShdw blurRad="57150" dist="19050" dir="5400000" algn="ctr" rotWithShape="0">
               <a:srgbClr val="000000">
-                <a:alpha val="38000"/>
+                <a:alpha val="63000"/>
               </a:srgbClr>
             </a:outerShdw>
           </a:effectLst>
-        </a:effectStyle>
-        <a:effectStyle>
-          <a:effectLst>
-            <a:outerShdw blurRad="40000" dist="23000" dir="5400000" rotWithShape="0">
-              <a:srgbClr val="000000">
-                <a:alpha val="35000"/>
-              </a:srgbClr>
-            </a:outerShdw>
-          </a:effectLst>
-        </a:effectStyle>
-        <a:effectStyle>
-          <a:effectLst>
-            <a:outerShdw blurRad="40000" dist="23000" dir="5400000" rotWithShape="0">
-              <a:srgbClr val="000000">
-                <a:alpha val="35000"/>
-              </a:srgbClr>
-            </a:outerShdw>
-          </a:effectLst>
-          <a:scene3d>
-            <a:camera prst="orthographicFront">
-              <a:rot lat="0" lon="0" rev="0"/>
-            </a:camera>
-            <a:lightRig rig="threePt" dir="t">
-              <a:rot lat="0" lon="0" rev="1200000"/>
-            </a:lightRig>
-          </a:scene3d>
-          <a:sp3d>
-            <a:bevelT w="63500" h="25400"/>
-          </a:sp3d>
         </a:effectStyle>
       </a:effectStyleLst>
       <a:bgFillStyleLst>
         <a:solidFill>
           <a:schemeClr val="phClr"/>
         </a:solidFill>
+        <a:solidFill>
+          <a:schemeClr val="phClr">
+            <a:tint val="95000"/>
+            <a:satMod val="170000"/>
+          </a:schemeClr>
+        </a:solidFill>
         <a:gradFill rotWithShape="1">
           <a:gsLst>
             <a:gs pos="0">
               <a:schemeClr val="phClr">
-                <a:tint val="40000"/>
-                <a:satMod val="350000"/>
+                <a:tint val="93000"/>
+                <a:satMod val="150000"/>
+                <a:shade val="98000"/>
+                <a:lumMod val="102000"/>
               </a:schemeClr>
             </a:gs>
-            <a:gs pos="40000">
+            <a:gs pos="50000">
               <a:schemeClr val="phClr">
-                <a:tint val="45000"/>
-                <a:shade val="99000"/>
-                <a:satMod val="350000"/>
+                <a:tint val="98000"/>
+                <a:satMod val="130000"/>
+                <a:shade val="90000"/>
+                <a:lumMod val="103000"/>
               </a:schemeClr>
             </a:gs>
             <a:gs pos="100000">
               <a:schemeClr val="phClr">
-                <a:shade val="20000"/>
-                <a:satMod val="255000"/>
+                <a:shade val="63000"/>
+                <a:satMod val="120000"/>
               </a:schemeClr>
             </a:gs>
           </a:gsLst>
-          <a:path path="circle">
-            <a:fillToRect l="50000" t="-80000" r="50000" b="180000"/>
-          </a:path>
-        </a:gradFill>
-        <a:gradFill rotWithShape="1">
-          <a:gsLst>
-            <a:gs pos="0">
-              <a:schemeClr val="phClr">
-                <a:tint val="80000"/>
-                <a:satMod val="300000"/>
-              </a:schemeClr>
-            </a:gs>
-            <a:gs pos="100000">
-              <a:schemeClr val="phClr">
-                <a:shade val="30000"/>
-                <a:satMod val="200000"/>
-              </a:schemeClr>
-            </a:gs>
-          </a:gsLst>
-          <a:path path="circle">
-            <a:fillToRect l="50000" t="50000" r="50000" b="50000"/>
-          </a:path>
+          <a:lin ang="5400000" scaled="0"/>
         </a:gradFill>
       </a:bgFillStyleLst>
     </a:fmtScheme>
   </a:themeElements>
-  <a:objectDefaults>
-    <a:spDef>
-      <a:spPr/>
-      <a:bodyPr/>
-      <a:lstStyle/>
-      <a:style>
-        <a:lnRef idx="1">
-          <a:schemeClr val="accent1"/>
-        </a:lnRef>
-        <a:fillRef idx="3">
-          <a:schemeClr val="accent1"/>
-        </a:fillRef>
-        <a:effectRef idx="2">
-          <a:schemeClr val="accent1"/>
-        </a:effectRef>
-        <a:fontRef idx="minor">
-          <a:schemeClr val="lt1"/>
-        </a:fontRef>
-      </a:style>
-    </a:spDef>
-    <a:lnDef>
-      <a:spPr/>
-      <a:bodyPr/>
-      <a:lstStyle/>
-      <a:style>
-        <a:lnRef idx="2">
-          <a:schemeClr val="accent1"/>
-        </a:lnRef>
-        <a:fillRef idx="0">
-          <a:schemeClr val="accent1"/>
-        </a:fillRef>
-        <a:effectRef idx="1">
-          <a:schemeClr val="accent1"/>
-        </a:effectRef>
-        <a:fontRef idx="minor">
-          <a:schemeClr val="tx1"/>
-        </a:fontRef>
-      </a:style>
-    </a:lnDef>
-  </a:objectDefaults>
+  <a:objectDefaults/>
   <a:extraClrSchemeLst/>
+  <a:extLst>
+    <a:ext uri="{05A4C25C-085E-4340-85A3-A5531E510DB2}">
+      <thm15:themeFamily xmlns:thm15="http://schemas.microsoft.com/office/thememl/2012/main" name="Office Theme" id="{62F939B6-93AF-4DB8-9C6B-D6C7DFDC589F}" vid="{4A3C46E8-61CC-4603-A589-7422A47A8E4A}"/>
+    </a:ext>
+  </a:extLst>
 </a:theme>
 </file>
</xml_diff>